<commit_message>
moved indexor processing into common class
</commit_message>
<xml_diff>
--- a/webapp/indexer/Indexer Architecture.pptx
+++ b/webapp/indexer/Indexer Architecture.pptx
@@ -13,6 +13,7 @@
     <p:sldId id="261" r:id="rId8"/>
     <p:sldId id="262" r:id="rId9"/>
     <p:sldId id="263" r:id="rId10"/>
+    <p:sldId id="264" r:id="rId11"/>
   </p:sldIdLst>
   <p:sldSz cx="10080625" cy="5670550"/>
   <p:notesSz cx="7559675" cy="10691813"/>
@@ -44,8 +45,8 @@
         </p:nvSpPr>
         <p:spPr>
           <a:xfrm flipH="1" flipV="1">
-            <a:off x="0" y="4500000"/>
-            <a:ext cx="10080000" cy="1170000"/>
+            <a:off x="-720" y="4499280"/>
+            <a:ext cx="10079640" cy="1169640"/>
           </a:xfrm>
           <a:prstGeom prst="flowChartDocument">
             <a:avLst/>
@@ -437,13 +438,13 @@
                 <a:srgbClr val="009bdd"/>
               </a:gs>
             </a:gsLst>
-            <a:lin ang="10800000"/>
+            <a:lin ang="0"/>
           </a:gradFill>
           <a:ln w="18000">
             <a:noFill/>
           </a:ln>
           <a:effectLst>
-            <a:outerShdw dist="10800" dir="5400000" blurRad="0" rotWithShape="0">
+            <a:outerShdw blurRad="0" dir="5400000" dist="10800" rotWithShape="0">
               <a:srgbClr val="009bdd"/>
             </a:outerShdw>
           </a:effectLst>
@@ -459,6 +460,11 @@
             <a:noAutofit/>
           </a:bodyPr>
           <a:p>
+            <a:pPr>
+              <a:lnSpc>
+                <a:spcPct val="100000"/>
+              </a:lnSpc>
+            </a:pPr>
             <a:endParaRPr b="0" lang="en-AU" sz="1800" strike="noStrike" u="none">
               <a:solidFill>
                 <a:srgbClr val="000000"/>
@@ -466,6 +472,7 @@
               <a:effectLst/>
               <a:uFillTx/>
               <a:latin typeface="Arial"/>
+              <a:ea typeface="DejaVu Sans"/>
             </a:endParaRPr>
           </a:p>
         </p:txBody>
@@ -483,7 +490,7 @@
         <p:spPr>
           <a:xfrm>
             <a:off x="0" y="1620000"/>
-            <a:ext cx="9000000" cy="1080000"/>
+            <a:ext cx="8999640" cy="1079640"/>
           </a:xfrm>
           <a:prstGeom prst="rect">
             <a:avLst/>
@@ -499,7 +506,13 @@
           </a:bodyPr>
           <a:p>
             <a:pPr indent="0" algn="ctr">
+              <a:lnSpc>
+                <a:spcPct val="100000"/>
+              </a:lnSpc>
               <a:buNone/>
+              <a:tabLst>
+                <a:tab algn="l" pos="0"/>
+              </a:tabLst>
             </a:pPr>
             <a:r>
               <a:rPr b="0" lang="en-AU" sz="3300" strike="noStrike" u="none">
@@ -514,7 +527,7 @@
             </a:r>
             <a:endParaRPr b="0" lang="en-AU" sz="3300" strike="noStrike" u="none">
               <a:solidFill>
-                <a:srgbClr val="dd4100"/>
+                <a:srgbClr val="000000"/>
               </a:solidFill>
               <a:effectLst/>
               <a:uFillTx/>
@@ -536,7 +549,7 @@
         <p:spPr>
           <a:xfrm>
             <a:off x="360000" y="2880000"/>
-            <a:ext cx="9360000" cy="1620000"/>
+            <a:ext cx="9359640" cy="1619640"/>
           </a:xfrm>
           <a:prstGeom prst="rect">
             <a:avLst/>
@@ -548,10 +561,13 @@
         </p:spPr>
         <p:txBody>
           <a:bodyPr lIns="0" rIns="0" tIns="0" bIns="0" anchor="t">
-            <a:normAutofit fontScale="92500" lnSpcReduction="19999"/>
+            <a:normAutofit fontScale="85000" lnSpcReduction="19999"/>
           </a:bodyPr>
           <a:p>
             <a:pPr marL="432000" indent="-324000">
+              <a:lnSpc>
+                <a:spcPct val="100000"/>
+              </a:lnSpc>
               <a:spcBef>
                 <a:spcPts val="1060"/>
               </a:spcBef>
@@ -575,7 +591,7 @@
             </a:r>
             <a:endParaRPr b="0" lang="en-AU" sz="2400" strike="noStrike" u="none">
               <a:solidFill>
-                <a:srgbClr val="009bdd"/>
+                <a:srgbClr val="000000"/>
               </a:solidFill>
               <a:effectLst/>
               <a:uFillTx/>
@@ -584,6 +600,9 @@
           </a:p>
           <a:p>
             <a:pPr lvl="1" marL="864000" indent="-324000">
+              <a:lnSpc>
+                <a:spcPct val="100000"/>
+              </a:lnSpc>
               <a:spcBef>
                 <a:spcPts val="850"/>
               </a:spcBef>
@@ -607,7 +626,7 @@
             </a:r>
             <a:endParaRPr b="0" lang="en-AU" sz="2100" strike="noStrike" u="none">
               <a:solidFill>
-                <a:srgbClr val="009bdd"/>
+                <a:srgbClr val="000000"/>
               </a:solidFill>
               <a:effectLst/>
               <a:uFillTx/>
@@ -616,6 +635,9 @@
           </a:p>
           <a:p>
             <a:pPr lvl="2" marL="1296000" indent="-288000">
+              <a:lnSpc>
+                <a:spcPct val="100000"/>
+              </a:lnSpc>
               <a:spcBef>
                 <a:spcPts val="635"/>
               </a:spcBef>
@@ -639,7 +661,7 @@
             </a:r>
             <a:endParaRPr b="0" lang="en-AU" sz="1800" strike="noStrike" u="none">
               <a:solidFill>
-                <a:srgbClr val="009bdd"/>
+                <a:srgbClr val="000000"/>
               </a:solidFill>
               <a:effectLst/>
               <a:uFillTx/>
@@ -648,6 +670,9 @@
           </a:p>
           <a:p>
             <a:pPr lvl="3" marL="1728000" indent="-216000">
+              <a:lnSpc>
+                <a:spcPct val="100000"/>
+              </a:lnSpc>
               <a:spcBef>
                 <a:spcPts val="422"/>
               </a:spcBef>
@@ -671,7 +696,7 @@
             </a:r>
             <a:endParaRPr b="0" lang="en-AU" sz="1500" strike="noStrike" u="none">
               <a:solidFill>
-                <a:srgbClr val="009bdd"/>
+                <a:srgbClr val="000000"/>
               </a:solidFill>
               <a:effectLst/>
               <a:uFillTx/>
@@ -680,6 +705,9 @@
           </a:p>
           <a:p>
             <a:pPr lvl="4" marL="2160000" indent="-216000">
+              <a:lnSpc>
+                <a:spcPct val="100000"/>
+              </a:lnSpc>
               <a:spcBef>
                 <a:spcPts val="210"/>
               </a:spcBef>
@@ -703,7 +731,7 @@
             </a:r>
             <a:endParaRPr b="0" lang="en-AU" sz="1500" strike="noStrike" u="none">
               <a:solidFill>
-                <a:srgbClr val="009bdd"/>
+                <a:srgbClr val="000000"/>
               </a:solidFill>
               <a:effectLst/>
               <a:uFillTx/>
@@ -712,6 +740,9 @@
           </a:p>
           <a:p>
             <a:pPr lvl="5" marL="2592000" indent="-216000">
+              <a:lnSpc>
+                <a:spcPct val="100000"/>
+              </a:lnSpc>
               <a:spcBef>
                 <a:spcPts val="210"/>
               </a:spcBef>
@@ -735,7 +766,7 @@
             </a:r>
             <a:endParaRPr b="0" lang="en-AU" sz="1500" strike="noStrike" u="none">
               <a:solidFill>
-                <a:srgbClr val="009bdd"/>
+                <a:srgbClr val="000000"/>
               </a:solidFill>
               <a:effectLst/>
               <a:uFillTx/>
@@ -744,6 +775,9 @@
           </a:p>
           <a:p>
             <a:pPr lvl="6" marL="3024000" indent="-216000">
+              <a:lnSpc>
+                <a:spcPct val="100000"/>
+              </a:lnSpc>
               <a:spcBef>
                 <a:spcPts val="210"/>
               </a:spcBef>
@@ -767,7 +801,7 @@
             </a:r>
             <a:endParaRPr b="0" lang="en-AU" sz="1500" strike="noStrike" u="none">
               <a:solidFill>
-                <a:srgbClr val="009bdd"/>
+                <a:srgbClr val="000000"/>
               </a:solidFill>
               <a:effectLst/>
               <a:uFillTx/>
@@ -789,7 +823,7 @@
         <p:spPr>
           <a:xfrm>
             <a:off x="360000" y="5220000"/>
-            <a:ext cx="2340000" cy="360000"/>
+            <a:ext cx="2339640" cy="359640"/>
           </a:xfrm>
           <a:prstGeom prst="rect">
             <a:avLst/>
@@ -805,7 +839,13 @@
           </a:bodyPr>
           <a:lstStyle>
             <a:lvl1pPr indent="0">
+              <a:lnSpc>
+                <a:spcPct val="100000"/>
+              </a:lnSpc>
               <a:buNone/>
+              <a:tabLst>
+                <a:tab algn="l" pos="0"/>
+              </a:tabLst>
               <a:defRPr b="0" lang="en-AU" sz="1400" strike="noStrike" u="none">
                 <a:solidFill>
                   <a:srgbClr val="ffffff"/>
@@ -818,7 +858,13 @@
           </a:lstStyle>
           <a:p>
             <a:pPr indent="0">
+              <a:lnSpc>
+                <a:spcPct val="100000"/>
+              </a:lnSpc>
               <a:buNone/>
+              <a:tabLst>
+                <a:tab algn="l" pos="0"/>
+              </a:tabLst>
             </a:pPr>
             <a:r>
               <a:rPr b="0" lang="en-AU" sz="1400" strike="noStrike" u="none">
@@ -833,11 +879,11 @@
             </a:r>
             <a:endParaRPr b="0" lang="en-AU" sz="1400" strike="noStrike" u="none">
               <a:solidFill>
-                <a:srgbClr val="ffffff"/>
+                <a:srgbClr val="000000"/>
               </a:solidFill>
               <a:effectLst/>
               <a:uFillTx/>
-              <a:latin typeface="Arial"/>
+              <a:latin typeface="Times New Roman"/>
             </a:endParaRPr>
           </a:p>
         </p:txBody>
@@ -855,7 +901,7 @@
         <p:spPr>
           <a:xfrm>
             <a:off x="3420000" y="5220000"/>
-            <a:ext cx="3240000" cy="360000"/>
+            <a:ext cx="3239640" cy="359640"/>
           </a:xfrm>
           <a:prstGeom prst="rect">
             <a:avLst/>
@@ -871,7 +917,13 @@
           </a:bodyPr>
           <a:lstStyle>
             <a:lvl1pPr indent="0" algn="ctr">
+              <a:lnSpc>
+                <a:spcPct val="100000"/>
+              </a:lnSpc>
               <a:buNone/>
+              <a:tabLst>
+                <a:tab algn="l" pos="0"/>
+              </a:tabLst>
               <a:defRPr b="0" lang="en-AU" sz="1400" strike="noStrike" u="none">
                 <a:solidFill>
                   <a:srgbClr val="ffffff"/>
@@ -884,7 +936,13 @@
           </a:lstStyle>
           <a:p>
             <a:pPr indent="0" algn="ctr">
+              <a:lnSpc>
+                <a:spcPct val="100000"/>
+              </a:lnSpc>
               <a:buNone/>
+              <a:tabLst>
+                <a:tab algn="l" pos="0"/>
+              </a:tabLst>
             </a:pPr>
             <a:r>
               <a:rPr b="0" lang="en-AU" sz="1400" strike="noStrike" u="none">
@@ -899,11 +957,11 @@
             </a:r>
             <a:endParaRPr b="0" lang="en-AU" sz="1400" strike="noStrike" u="none">
               <a:solidFill>
-                <a:srgbClr val="ffffff"/>
+                <a:srgbClr val="000000"/>
               </a:solidFill>
               <a:effectLst/>
               <a:uFillTx/>
-              <a:latin typeface="Arial"/>
+              <a:latin typeface="Times New Roman"/>
             </a:endParaRPr>
           </a:p>
         </p:txBody>
@@ -921,7 +979,7 @@
         <p:spPr>
           <a:xfrm>
             <a:off x="7380000" y="5220000"/>
-            <a:ext cx="2340000" cy="360000"/>
+            <a:ext cx="2339640" cy="359640"/>
           </a:xfrm>
           <a:prstGeom prst="rect">
             <a:avLst/>
@@ -937,7 +995,13 @@
           </a:bodyPr>
           <a:lstStyle>
             <a:lvl1pPr indent="0" algn="r">
+              <a:lnSpc>
+                <a:spcPct val="100000"/>
+              </a:lnSpc>
               <a:buNone/>
+              <a:tabLst>
+                <a:tab algn="l" pos="0"/>
+              </a:tabLst>
               <a:defRPr b="0" lang="en-AU" sz="1400" strike="noStrike" u="none">
                 <a:solidFill>
                   <a:srgbClr val="ffffff"/>
@@ -950,9 +1014,15 @@
           </a:lstStyle>
           <a:p>
             <a:pPr indent="0" algn="r">
+              <a:lnSpc>
+                <a:spcPct val="100000"/>
+              </a:lnSpc>
               <a:buNone/>
+              <a:tabLst>
+                <a:tab algn="l" pos="0"/>
+              </a:tabLst>
             </a:pPr>
-            <a:fld id="{F7134311-3B6C-4134-B679-CE0653F26A46}" type="slidenum">
+            <a:fld id="{5561C48B-1B2C-47B0-B43F-84CB175F9CEB}" type="slidenum">
               <a:rPr b="0" lang="en-AU" sz="1400" strike="noStrike" u="none">
                 <a:solidFill>
                   <a:srgbClr val="ffffff"/>
@@ -965,11 +1035,11 @@
             </a:fld>
             <a:endParaRPr b="0" lang="en-AU" sz="1400" strike="noStrike" u="none">
               <a:solidFill>
-                <a:srgbClr val="ffffff"/>
+                <a:srgbClr val="000000"/>
               </a:solidFill>
               <a:effectLst/>
               <a:uFillTx/>
-              <a:latin typeface="Arial"/>
+              <a:latin typeface="Times New Roman"/>
             </a:endParaRPr>
           </a:p>
         </p:txBody>
@@ -981,7 +1051,7 @@
 
 <file path=ppt/slideLayouts/slideLayout2.xml><?xml version="1.0" encoding="utf-8"?>
 <p:sldLayout xmlns:a="http://schemas.openxmlformats.org/drawingml/2006/main" xmlns:p="http://schemas.openxmlformats.org/presentationml/2006/main" xmlns:r="http://schemas.openxmlformats.org/officeDocument/2006/relationships" xmlns:p14="http://schemas.microsoft.com/office/powerpoint/2010/main" xmlns:p15="http://schemas.microsoft.com/office/powerpoint/2012/main" xmlns:mc="http://schemas.openxmlformats.org/markup-compatibility/2006" type="tx" preserve="1">
-  <p:cSld name="Blue_Curve">
+  <p:cSld name="Default">
     <p:spTree>
       <p:nvGrpSpPr>
         <p:cNvPr id="1" name=""/>
@@ -998,14 +1068,14 @@
       </p:grpSpPr>
       <p:sp>
         <p:nvSpPr>
-          <p:cNvPr id="0" name=""/>
+          <p:cNvPr id="6" name=""/>
           <p:cNvSpPr/>
           <p:nvPr/>
         </p:nvSpPr>
         <p:spPr>
           <a:xfrm flipH="1" flipV="1">
-            <a:off x="0" y="4500000"/>
-            <a:ext cx="10080000" cy="1170000"/>
+            <a:off x="-720" y="4499280"/>
+            <a:ext cx="10079640" cy="1169640"/>
           </a:xfrm>
           <a:prstGeom prst="flowChartDocument">
             <a:avLst/>
@@ -1397,13 +1467,13 @@
                 <a:srgbClr val="009bdd"/>
               </a:gs>
             </a:gsLst>
-            <a:lin ang="10800000"/>
+            <a:lin ang="0"/>
           </a:gradFill>
           <a:ln w="18000">
             <a:noFill/>
           </a:ln>
           <a:effectLst>
-            <a:outerShdw dist="10800" dir="5400000" blurRad="0" rotWithShape="0">
+            <a:outerShdw blurRad="0" dir="5400000" dist="10800" rotWithShape="0">
               <a:srgbClr val="009bdd"/>
             </a:outerShdw>
           </a:effectLst>
@@ -1419,6 +1489,11 @@
             <a:noAutofit/>
           </a:bodyPr>
           <a:p>
+            <a:pPr>
+              <a:lnSpc>
+                <a:spcPct val="100000"/>
+              </a:lnSpc>
+            </a:pPr>
             <a:endParaRPr b="0" lang="en-AU" sz="1800" strike="noStrike" u="none">
               <a:solidFill>
                 <a:srgbClr val="000000"/>
@@ -1426,13 +1501,14 @@
               <a:effectLst/>
               <a:uFillTx/>
               <a:latin typeface="Arial"/>
+              <a:ea typeface="DejaVu Sans"/>
             </a:endParaRPr>
           </a:p>
         </p:txBody>
       </p:sp>
       <p:sp>
         <p:nvSpPr>
-          <p:cNvPr id="6" name="PlaceHolder 1"/>
+          <p:cNvPr id="7" name="PlaceHolder 1"/>
           <p:cNvSpPr>
             <a:spLocks noGrp="1"/>
           </p:cNvSpPr>
@@ -1443,7 +1519,7 @@
         <p:spPr>
           <a:xfrm>
             <a:off x="0" y="1620000"/>
-            <a:ext cx="9000000" cy="1080000"/>
+            <a:ext cx="8999640" cy="1079640"/>
           </a:xfrm>
           <a:prstGeom prst="rect">
             <a:avLst/>
@@ -1459,7 +1535,13 @@
           </a:bodyPr>
           <a:p>
             <a:pPr indent="0" algn="ctr">
+              <a:lnSpc>
+                <a:spcPct val="100000"/>
+              </a:lnSpc>
               <a:buNone/>
+              <a:tabLst>
+                <a:tab algn="l" pos="0"/>
+              </a:tabLst>
             </a:pPr>
             <a:r>
               <a:rPr b="0" lang="en-AU" sz="3300" strike="noStrike" u="none">
@@ -1474,7 +1556,7 @@
             </a:r>
             <a:endParaRPr b="0" lang="en-AU" sz="3300" strike="noStrike" u="none">
               <a:solidFill>
-                <a:srgbClr val="dd4100"/>
+                <a:srgbClr val="000000"/>
               </a:solidFill>
               <a:effectLst/>
               <a:uFillTx/>
@@ -1485,7 +1567,7 @@
       </p:sp>
       <p:sp>
         <p:nvSpPr>
-          <p:cNvPr id="7" name="PlaceHolder 2"/>
+          <p:cNvPr id="8" name="PlaceHolder 2"/>
           <p:cNvSpPr>
             <a:spLocks noGrp="1"/>
           </p:cNvSpPr>
@@ -1496,7 +1578,7 @@
         <p:spPr>
           <a:xfrm>
             <a:off x="360000" y="2880000"/>
-            <a:ext cx="9360000" cy="1620000"/>
+            <a:ext cx="9359640" cy="1619640"/>
           </a:xfrm>
           <a:prstGeom prst="rect">
             <a:avLst/>
@@ -1508,10 +1590,13 @@
         </p:spPr>
         <p:txBody>
           <a:bodyPr lIns="0" rIns="0" tIns="0" bIns="0" anchor="t">
-            <a:normAutofit fontScale="92500" lnSpcReduction="19999"/>
+            <a:normAutofit fontScale="85000" lnSpcReduction="19999"/>
           </a:bodyPr>
           <a:p>
             <a:pPr marL="432000" indent="-324000">
+              <a:lnSpc>
+                <a:spcPct val="100000"/>
+              </a:lnSpc>
               <a:spcBef>
                 <a:spcPts val="1060"/>
               </a:spcBef>
@@ -1535,7 +1620,7 @@
             </a:r>
             <a:endParaRPr b="0" lang="en-AU" sz="2400" strike="noStrike" u="none">
               <a:solidFill>
-                <a:srgbClr val="009bdd"/>
+                <a:srgbClr val="000000"/>
               </a:solidFill>
               <a:effectLst/>
               <a:uFillTx/>
@@ -1544,6 +1629,9 @@
           </a:p>
           <a:p>
             <a:pPr lvl="1" marL="864000" indent="-324000">
+              <a:lnSpc>
+                <a:spcPct val="100000"/>
+              </a:lnSpc>
               <a:spcBef>
                 <a:spcPts val="850"/>
               </a:spcBef>
@@ -1567,7 +1655,7 @@
             </a:r>
             <a:endParaRPr b="0" lang="en-AU" sz="2100" strike="noStrike" u="none">
               <a:solidFill>
-                <a:srgbClr val="009bdd"/>
+                <a:srgbClr val="000000"/>
               </a:solidFill>
               <a:effectLst/>
               <a:uFillTx/>
@@ -1576,6 +1664,9 @@
           </a:p>
           <a:p>
             <a:pPr lvl="2" marL="1296000" indent="-288000">
+              <a:lnSpc>
+                <a:spcPct val="100000"/>
+              </a:lnSpc>
               <a:spcBef>
                 <a:spcPts val="635"/>
               </a:spcBef>
@@ -1599,7 +1690,7 @@
             </a:r>
             <a:endParaRPr b="0" lang="en-AU" sz="1800" strike="noStrike" u="none">
               <a:solidFill>
-                <a:srgbClr val="009bdd"/>
+                <a:srgbClr val="000000"/>
               </a:solidFill>
               <a:effectLst/>
               <a:uFillTx/>
@@ -1608,6 +1699,9 @@
           </a:p>
           <a:p>
             <a:pPr lvl="3" marL="1728000" indent="-216000">
+              <a:lnSpc>
+                <a:spcPct val="100000"/>
+              </a:lnSpc>
               <a:spcBef>
                 <a:spcPts val="422"/>
               </a:spcBef>
@@ -1631,7 +1725,7 @@
             </a:r>
             <a:endParaRPr b="0" lang="en-AU" sz="1500" strike="noStrike" u="none">
               <a:solidFill>
-                <a:srgbClr val="009bdd"/>
+                <a:srgbClr val="000000"/>
               </a:solidFill>
               <a:effectLst/>
               <a:uFillTx/>
@@ -1640,6 +1734,9 @@
           </a:p>
           <a:p>
             <a:pPr lvl="4" marL="2160000" indent="-216000">
+              <a:lnSpc>
+                <a:spcPct val="100000"/>
+              </a:lnSpc>
               <a:spcBef>
                 <a:spcPts val="210"/>
               </a:spcBef>
@@ -1663,7 +1760,7 @@
             </a:r>
             <a:endParaRPr b="0" lang="en-AU" sz="1500" strike="noStrike" u="none">
               <a:solidFill>
-                <a:srgbClr val="009bdd"/>
+                <a:srgbClr val="000000"/>
               </a:solidFill>
               <a:effectLst/>
               <a:uFillTx/>
@@ -1672,6 +1769,9 @@
           </a:p>
           <a:p>
             <a:pPr lvl="5" marL="2592000" indent="-216000">
+              <a:lnSpc>
+                <a:spcPct val="100000"/>
+              </a:lnSpc>
               <a:spcBef>
                 <a:spcPts val="210"/>
               </a:spcBef>
@@ -1695,7 +1795,7 @@
             </a:r>
             <a:endParaRPr b="0" lang="en-AU" sz="1500" strike="noStrike" u="none">
               <a:solidFill>
-                <a:srgbClr val="009bdd"/>
+                <a:srgbClr val="000000"/>
               </a:solidFill>
               <a:effectLst/>
               <a:uFillTx/>
@@ -1704,6 +1804,9 @@
           </a:p>
           <a:p>
             <a:pPr lvl="6" marL="3024000" indent="-216000">
+              <a:lnSpc>
+                <a:spcPct val="100000"/>
+              </a:lnSpc>
               <a:spcBef>
                 <a:spcPts val="210"/>
               </a:spcBef>
@@ -1727,7 +1830,7 @@
             </a:r>
             <a:endParaRPr b="0" lang="en-AU" sz="1500" strike="noStrike" u="none">
               <a:solidFill>
-                <a:srgbClr val="009bdd"/>
+                <a:srgbClr val="000000"/>
               </a:solidFill>
               <a:effectLst/>
               <a:uFillTx/>
@@ -1738,7 +1841,7 @@
       </p:sp>
       <p:sp>
         <p:nvSpPr>
-          <p:cNvPr id="8" name="PlaceHolder 3"/>
+          <p:cNvPr id="9" name="PlaceHolder 3"/>
           <p:cNvSpPr>
             <a:spLocks noGrp="1"/>
           </p:cNvSpPr>
@@ -1749,7 +1852,7 @@
         <p:spPr>
           <a:xfrm>
             <a:off x="360000" y="5220000"/>
-            <a:ext cx="2340000" cy="360000"/>
+            <a:ext cx="2339640" cy="359640"/>
           </a:xfrm>
           <a:prstGeom prst="rect">
             <a:avLst/>
@@ -1765,7 +1868,13 @@
           </a:bodyPr>
           <a:lstStyle>
             <a:lvl1pPr indent="0">
+              <a:lnSpc>
+                <a:spcPct val="100000"/>
+              </a:lnSpc>
               <a:buNone/>
+              <a:tabLst>
+                <a:tab algn="l" pos="0"/>
+              </a:tabLst>
               <a:defRPr b="0" lang="en-AU" sz="1400" strike="noStrike" u="none">
                 <a:solidFill>
                   <a:srgbClr val="ffffff"/>
@@ -1778,7 +1887,13 @@
           </a:lstStyle>
           <a:p>
             <a:pPr indent="0">
+              <a:lnSpc>
+                <a:spcPct val="100000"/>
+              </a:lnSpc>
               <a:buNone/>
+              <a:tabLst>
+                <a:tab algn="l" pos="0"/>
+              </a:tabLst>
             </a:pPr>
             <a:r>
               <a:rPr b="0" lang="en-AU" sz="1400" strike="noStrike" u="none">
@@ -1793,18 +1908,18 @@
             </a:r>
             <a:endParaRPr b="0" lang="en-AU" sz="1400" strike="noStrike" u="none">
               <a:solidFill>
-                <a:srgbClr val="ffffff"/>
+                <a:srgbClr val="000000"/>
               </a:solidFill>
               <a:effectLst/>
               <a:uFillTx/>
-              <a:latin typeface="Arial"/>
+              <a:latin typeface="Times New Roman"/>
             </a:endParaRPr>
           </a:p>
         </p:txBody>
       </p:sp>
       <p:sp>
         <p:nvSpPr>
-          <p:cNvPr id="9" name="PlaceHolder 4"/>
+          <p:cNvPr id="10" name="PlaceHolder 4"/>
           <p:cNvSpPr>
             <a:spLocks noGrp="1"/>
           </p:cNvSpPr>
@@ -1815,7 +1930,7 @@
         <p:spPr>
           <a:xfrm>
             <a:off x="3420000" y="5220000"/>
-            <a:ext cx="3240000" cy="360000"/>
+            <a:ext cx="3239640" cy="359640"/>
           </a:xfrm>
           <a:prstGeom prst="rect">
             <a:avLst/>
@@ -1831,7 +1946,13 @@
           </a:bodyPr>
           <a:lstStyle>
             <a:lvl1pPr indent="0" algn="ctr">
+              <a:lnSpc>
+                <a:spcPct val="100000"/>
+              </a:lnSpc>
               <a:buNone/>
+              <a:tabLst>
+                <a:tab algn="l" pos="0"/>
+              </a:tabLst>
               <a:defRPr b="0" lang="en-AU" sz="1400" strike="noStrike" u="none">
                 <a:solidFill>
                   <a:srgbClr val="ffffff"/>
@@ -1844,7 +1965,13 @@
           </a:lstStyle>
           <a:p>
             <a:pPr indent="0" algn="ctr">
+              <a:lnSpc>
+                <a:spcPct val="100000"/>
+              </a:lnSpc>
               <a:buNone/>
+              <a:tabLst>
+                <a:tab algn="l" pos="0"/>
+              </a:tabLst>
             </a:pPr>
             <a:r>
               <a:rPr b="0" lang="en-AU" sz="1400" strike="noStrike" u="none">
@@ -1859,18 +1986,18 @@
             </a:r>
             <a:endParaRPr b="0" lang="en-AU" sz="1400" strike="noStrike" u="none">
               <a:solidFill>
-                <a:srgbClr val="ffffff"/>
+                <a:srgbClr val="000000"/>
               </a:solidFill>
               <a:effectLst/>
               <a:uFillTx/>
-              <a:latin typeface="Arial"/>
+              <a:latin typeface="Times New Roman"/>
             </a:endParaRPr>
           </a:p>
         </p:txBody>
       </p:sp>
       <p:sp>
         <p:nvSpPr>
-          <p:cNvPr id="10" name="PlaceHolder 5"/>
+          <p:cNvPr id="11" name="PlaceHolder 5"/>
           <p:cNvSpPr>
             <a:spLocks noGrp="1"/>
           </p:cNvSpPr>
@@ -1881,7 +2008,7 @@
         <p:spPr>
           <a:xfrm>
             <a:off x="7380000" y="5220000"/>
-            <a:ext cx="2340000" cy="360000"/>
+            <a:ext cx="2339640" cy="359640"/>
           </a:xfrm>
           <a:prstGeom prst="rect">
             <a:avLst/>
@@ -1897,7 +2024,13 @@
           </a:bodyPr>
           <a:lstStyle>
             <a:lvl1pPr indent="0" algn="r">
+              <a:lnSpc>
+                <a:spcPct val="100000"/>
+              </a:lnSpc>
               <a:buNone/>
+              <a:tabLst>
+                <a:tab algn="l" pos="0"/>
+              </a:tabLst>
               <a:defRPr b="0" lang="en-AU" sz="1400" strike="noStrike" u="none">
                 <a:solidFill>
                   <a:srgbClr val="ffffff"/>
@@ -1910,9 +2043,15 @@
           </a:lstStyle>
           <a:p>
             <a:pPr indent="0" algn="r">
+              <a:lnSpc>
+                <a:spcPct val="100000"/>
+              </a:lnSpc>
               <a:buNone/>
+              <a:tabLst>
+                <a:tab algn="l" pos="0"/>
+              </a:tabLst>
             </a:pPr>
-            <a:fld id="{8C8208BE-485B-44FE-B896-23B4B1156852}" type="slidenum">
+            <a:fld id="{13543DEC-25C8-4F02-926A-5B2D3DB33AD8}" type="slidenum">
               <a:rPr b="0" lang="en-AU" sz="1400" strike="noStrike" u="none">
                 <a:solidFill>
                   <a:srgbClr val="ffffff"/>
@@ -1925,11 +2064,11 @@
             </a:fld>
             <a:endParaRPr b="0" lang="en-AU" sz="1400" strike="noStrike" u="none">
               <a:solidFill>
-                <a:srgbClr val="ffffff"/>
+                <a:srgbClr val="000000"/>
               </a:solidFill>
               <a:effectLst/>
               <a:uFillTx/>
-              <a:latin typeface="Arial"/>
+              <a:latin typeface="Times New Roman"/>
             </a:endParaRPr>
           </a:p>
         </p:txBody>
@@ -1958,14 +2097,14 @@
       </p:grpSpPr>
       <p:sp>
         <p:nvSpPr>
-          <p:cNvPr id="11" name=""/>
+          <p:cNvPr id="12" name=""/>
           <p:cNvSpPr/>
           <p:nvPr/>
         </p:nvSpPr>
         <p:spPr>
           <a:xfrm>
             <a:off x="0" y="0"/>
-            <a:ext cx="10076760" cy="720000"/>
+            <a:ext cx="10076400" cy="719640"/>
           </a:xfrm>
           <a:prstGeom prst="rect">
             <a:avLst/>
@@ -2363,7 +2502,7 @@
             <a:noFill/>
           </a:ln>
           <a:effectLst>
-            <a:outerShdw dist="10800" dir="5400000" blurRad="0" rotWithShape="0">
+            <a:outerShdw blurRad="0" dir="5400000" dist="10800" rotWithShape="0">
               <a:srgbClr val="009bdd"/>
             </a:outerShdw>
           </a:effectLst>
@@ -2379,6 +2518,11 @@
             <a:noAutofit/>
           </a:bodyPr>
           <a:p>
+            <a:pPr>
+              <a:lnSpc>
+                <a:spcPct val="100000"/>
+              </a:lnSpc>
+            </a:pPr>
             <a:endParaRPr b="0" lang="en-AU" sz="1800" strike="noStrike" u="none">
               <a:solidFill>
                 <a:srgbClr val="000000"/>
@@ -2386,20 +2530,21 @@
               <a:effectLst/>
               <a:uFillTx/>
               <a:latin typeface="Arial"/>
+              <a:ea typeface="DejaVu Sans"/>
             </a:endParaRPr>
           </a:p>
         </p:txBody>
       </p:sp>
       <p:sp>
         <p:nvSpPr>
-          <p:cNvPr id="12" name=""/>
+          <p:cNvPr id="13" name=""/>
           <p:cNvSpPr/>
           <p:nvPr/>
         </p:nvSpPr>
         <p:spPr>
           <a:xfrm>
             <a:off x="3240" y="5040000"/>
-            <a:ext cx="10076760" cy="631440"/>
+            <a:ext cx="10076400" cy="631080"/>
           </a:xfrm>
           <a:prstGeom prst="rect">
             <a:avLst/>
@@ -2797,7 +2942,7 @@
             <a:noFill/>
           </a:ln>
           <a:effectLst>
-            <a:outerShdw dist="10800" dir="5400000" blurRad="0" rotWithShape="0">
+            <a:outerShdw blurRad="0" dir="5400000" dist="10800" rotWithShape="0">
               <a:srgbClr val="009bdd"/>
             </a:outerShdw>
           </a:effectLst>
@@ -2813,6 +2958,11 @@
             <a:noAutofit/>
           </a:bodyPr>
           <a:p>
+            <a:pPr>
+              <a:lnSpc>
+                <a:spcPct val="100000"/>
+              </a:lnSpc>
+            </a:pPr>
             <a:endParaRPr b="0" lang="en-AU" sz="1800" strike="noStrike" u="none">
               <a:solidFill>
                 <a:srgbClr val="000000"/>
@@ -2820,13 +2970,14 @@
               <a:effectLst/>
               <a:uFillTx/>
               <a:latin typeface="Arial"/>
+              <a:ea typeface="DejaVu Sans"/>
             </a:endParaRPr>
           </a:p>
         </p:txBody>
       </p:sp>
       <p:sp>
         <p:nvSpPr>
-          <p:cNvPr id="13" name="PlaceHolder 1"/>
+          <p:cNvPr id="14" name="PlaceHolder 1"/>
           <p:cNvSpPr>
             <a:spLocks noGrp="1"/>
           </p:cNvSpPr>
@@ -2837,7 +2988,7 @@
         <p:spPr>
           <a:xfrm>
             <a:off x="360000" y="180000"/>
-            <a:ext cx="9360000" cy="478080"/>
+            <a:ext cx="9359640" cy="477720"/>
           </a:xfrm>
           <a:prstGeom prst="rect">
             <a:avLst/>
@@ -2853,7 +3004,13 @@
           </a:bodyPr>
           <a:p>
             <a:pPr indent="0" algn="ctr">
+              <a:lnSpc>
+                <a:spcPct val="100000"/>
+              </a:lnSpc>
               <a:buNone/>
+              <a:tabLst>
+                <a:tab algn="l" pos="0"/>
+              </a:tabLst>
             </a:pPr>
             <a:r>
               <a:rPr b="0" lang="en-AU" sz="3300" strike="noStrike" u="none">
@@ -2868,7 +3025,7 @@
             </a:r>
             <a:endParaRPr b="0" lang="en-AU" sz="3300" strike="noStrike" u="none">
               <a:solidFill>
-                <a:srgbClr val="eeeeee"/>
+                <a:srgbClr val="000000"/>
               </a:solidFill>
               <a:effectLst/>
               <a:uFillTx/>
@@ -2879,7 +3036,7 @@
       </p:sp>
       <p:sp>
         <p:nvSpPr>
-          <p:cNvPr id="14" name="PlaceHolder 2"/>
+          <p:cNvPr id="15" name="PlaceHolder 2"/>
           <p:cNvSpPr>
             <a:spLocks noGrp="1"/>
           </p:cNvSpPr>
@@ -2890,7 +3047,7 @@
         <p:spPr>
           <a:xfrm>
             <a:off x="360000" y="1080000"/>
-            <a:ext cx="9360000" cy="3600000"/>
+            <a:ext cx="9359640" cy="3599640"/>
           </a:xfrm>
           <a:prstGeom prst="rect">
             <a:avLst/>
@@ -2906,6 +3063,9 @@
           </a:bodyPr>
           <a:p>
             <a:pPr marL="432000" indent="-324000">
+              <a:lnSpc>
+                <a:spcPct val="100000"/>
+              </a:lnSpc>
               <a:spcBef>
                 <a:spcPts val="1060"/>
               </a:spcBef>
@@ -2929,7 +3089,7 @@
             </a:r>
             <a:endParaRPr b="0" lang="en-AU" sz="2400" strike="noStrike" u="none">
               <a:solidFill>
-                <a:srgbClr val="009bdd"/>
+                <a:srgbClr val="000000"/>
               </a:solidFill>
               <a:effectLst/>
               <a:uFillTx/>
@@ -2938,6 +3098,9 @@
           </a:p>
           <a:p>
             <a:pPr lvl="1" marL="864000" indent="-324000">
+              <a:lnSpc>
+                <a:spcPct val="100000"/>
+              </a:lnSpc>
               <a:spcBef>
                 <a:spcPts val="850"/>
               </a:spcBef>
@@ -2961,7 +3124,7 @@
             </a:r>
             <a:endParaRPr b="0" lang="en-AU" sz="2100" strike="noStrike" u="none">
               <a:solidFill>
-                <a:srgbClr val="009bdd"/>
+                <a:srgbClr val="000000"/>
               </a:solidFill>
               <a:effectLst/>
               <a:uFillTx/>
@@ -2970,6 +3133,9 @@
           </a:p>
           <a:p>
             <a:pPr lvl="2" marL="1296000" indent="-288000">
+              <a:lnSpc>
+                <a:spcPct val="100000"/>
+              </a:lnSpc>
               <a:spcBef>
                 <a:spcPts val="635"/>
               </a:spcBef>
@@ -2993,7 +3159,7 @@
             </a:r>
             <a:endParaRPr b="0" lang="en-AU" sz="1800" strike="noStrike" u="none">
               <a:solidFill>
-                <a:srgbClr val="009bdd"/>
+                <a:srgbClr val="000000"/>
               </a:solidFill>
               <a:effectLst/>
               <a:uFillTx/>
@@ -3002,6 +3168,9 @@
           </a:p>
           <a:p>
             <a:pPr lvl="3" marL="1728000" indent="-216000">
+              <a:lnSpc>
+                <a:spcPct val="100000"/>
+              </a:lnSpc>
               <a:spcBef>
                 <a:spcPts val="422"/>
               </a:spcBef>
@@ -3025,7 +3194,7 @@
             </a:r>
             <a:endParaRPr b="0" lang="en-AU" sz="1500" strike="noStrike" u="none">
               <a:solidFill>
-                <a:srgbClr val="009bdd"/>
+                <a:srgbClr val="000000"/>
               </a:solidFill>
               <a:effectLst/>
               <a:uFillTx/>
@@ -3034,6 +3203,9 @@
           </a:p>
           <a:p>
             <a:pPr lvl="4" marL="2160000" indent="-216000">
+              <a:lnSpc>
+                <a:spcPct val="100000"/>
+              </a:lnSpc>
               <a:spcBef>
                 <a:spcPts val="210"/>
               </a:spcBef>
@@ -3057,7 +3229,7 @@
             </a:r>
             <a:endParaRPr b="0" lang="en-AU" sz="1500" strike="noStrike" u="none">
               <a:solidFill>
-                <a:srgbClr val="009bdd"/>
+                <a:srgbClr val="000000"/>
               </a:solidFill>
               <a:effectLst/>
               <a:uFillTx/>
@@ -3066,6 +3238,9 @@
           </a:p>
           <a:p>
             <a:pPr lvl="5" marL="2592000" indent="-216000">
+              <a:lnSpc>
+                <a:spcPct val="100000"/>
+              </a:lnSpc>
               <a:spcBef>
                 <a:spcPts val="210"/>
               </a:spcBef>
@@ -3089,7 +3264,7 @@
             </a:r>
             <a:endParaRPr b="0" lang="en-AU" sz="1500" strike="noStrike" u="none">
               <a:solidFill>
-                <a:srgbClr val="009bdd"/>
+                <a:srgbClr val="000000"/>
               </a:solidFill>
               <a:effectLst/>
               <a:uFillTx/>
@@ -3098,6 +3273,9 @@
           </a:p>
           <a:p>
             <a:pPr lvl="6" marL="3024000" indent="-216000">
+              <a:lnSpc>
+                <a:spcPct val="100000"/>
+              </a:lnSpc>
               <a:spcBef>
                 <a:spcPts val="210"/>
               </a:spcBef>
@@ -3121,7 +3299,7 @@
             </a:r>
             <a:endParaRPr b="0" lang="en-AU" sz="1500" strike="noStrike" u="none">
               <a:solidFill>
-                <a:srgbClr val="009bdd"/>
+                <a:srgbClr val="000000"/>
               </a:solidFill>
               <a:effectLst/>
               <a:uFillTx/>
@@ -3132,7 +3310,7 @@
       </p:sp>
       <p:sp>
         <p:nvSpPr>
-          <p:cNvPr id="15" name="PlaceHolder 3"/>
+          <p:cNvPr id="16" name="PlaceHolder 3"/>
           <p:cNvSpPr>
             <a:spLocks noGrp="1"/>
           </p:cNvSpPr>
@@ -3143,7 +3321,7 @@
         <p:spPr>
           <a:xfrm>
             <a:off x="360000" y="5220000"/>
-            <a:ext cx="2340000" cy="360000"/>
+            <a:ext cx="2339640" cy="359640"/>
           </a:xfrm>
           <a:prstGeom prst="rect">
             <a:avLst/>
@@ -3159,7 +3337,13 @@
           </a:bodyPr>
           <a:lstStyle>
             <a:lvl1pPr indent="0">
+              <a:lnSpc>
+                <a:spcPct val="100000"/>
+              </a:lnSpc>
               <a:buNone/>
+              <a:tabLst>
+                <a:tab algn="l" pos="0"/>
+              </a:tabLst>
               <a:defRPr b="0" lang="en-AU" sz="1400" strike="noStrike" u="none">
                 <a:solidFill>
                   <a:srgbClr val="ffffff"/>
@@ -3172,7 +3356,13 @@
           </a:lstStyle>
           <a:p>
             <a:pPr indent="0">
+              <a:lnSpc>
+                <a:spcPct val="100000"/>
+              </a:lnSpc>
               <a:buNone/>
+              <a:tabLst>
+                <a:tab algn="l" pos="0"/>
+              </a:tabLst>
             </a:pPr>
             <a:r>
               <a:rPr b="0" lang="en-AU" sz="1400" strike="noStrike" u="none">
@@ -3187,18 +3377,18 @@
             </a:r>
             <a:endParaRPr b="0" lang="en-AU" sz="1400" strike="noStrike" u="none">
               <a:solidFill>
-                <a:srgbClr val="ffffff"/>
+                <a:srgbClr val="000000"/>
               </a:solidFill>
               <a:effectLst/>
               <a:uFillTx/>
-              <a:latin typeface="Arial"/>
+              <a:latin typeface="Times New Roman"/>
             </a:endParaRPr>
           </a:p>
         </p:txBody>
       </p:sp>
       <p:sp>
         <p:nvSpPr>
-          <p:cNvPr id="16" name="PlaceHolder 4"/>
+          <p:cNvPr id="17" name="PlaceHolder 4"/>
           <p:cNvSpPr>
             <a:spLocks noGrp="1"/>
           </p:cNvSpPr>
@@ -3209,7 +3399,7 @@
         <p:spPr>
           <a:xfrm>
             <a:off x="3420000" y="5220000"/>
-            <a:ext cx="3240000" cy="360000"/>
+            <a:ext cx="3239640" cy="359640"/>
           </a:xfrm>
           <a:prstGeom prst="rect">
             <a:avLst/>
@@ -3225,7 +3415,13 @@
           </a:bodyPr>
           <a:lstStyle>
             <a:lvl1pPr indent="0" algn="ctr">
+              <a:lnSpc>
+                <a:spcPct val="100000"/>
+              </a:lnSpc>
               <a:buNone/>
+              <a:tabLst>
+                <a:tab algn="l" pos="0"/>
+              </a:tabLst>
               <a:defRPr b="0" lang="en-AU" sz="1400" strike="noStrike" u="none">
                 <a:solidFill>
                   <a:srgbClr val="ffffff"/>
@@ -3238,7 +3434,13 @@
           </a:lstStyle>
           <a:p>
             <a:pPr indent="0" algn="ctr">
+              <a:lnSpc>
+                <a:spcPct val="100000"/>
+              </a:lnSpc>
               <a:buNone/>
+              <a:tabLst>
+                <a:tab algn="l" pos="0"/>
+              </a:tabLst>
             </a:pPr>
             <a:r>
               <a:rPr b="0" lang="en-AU" sz="1400" strike="noStrike" u="none">
@@ -3253,18 +3455,18 @@
             </a:r>
             <a:endParaRPr b="0" lang="en-AU" sz="1400" strike="noStrike" u="none">
               <a:solidFill>
-                <a:srgbClr val="ffffff"/>
+                <a:srgbClr val="000000"/>
               </a:solidFill>
               <a:effectLst/>
               <a:uFillTx/>
-              <a:latin typeface="Arial"/>
+              <a:latin typeface="Times New Roman"/>
             </a:endParaRPr>
           </a:p>
         </p:txBody>
       </p:sp>
       <p:sp>
         <p:nvSpPr>
-          <p:cNvPr id="17" name="PlaceHolder 5"/>
+          <p:cNvPr id="18" name="PlaceHolder 5"/>
           <p:cNvSpPr>
             <a:spLocks noGrp="1"/>
           </p:cNvSpPr>
@@ -3275,7 +3477,7 @@
         <p:spPr>
           <a:xfrm>
             <a:off x="7380000" y="5220000"/>
-            <a:ext cx="2340000" cy="360000"/>
+            <a:ext cx="2339640" cy="359640"/>
           </a:xfrm>
           <a:prstGeom prst="rect">
             <a:avLst/>
@@ -3291,7 +3493,13 @@
           </a:bodyPr>
           <a:lstStyle>
             <a:lvl1pPr indent="0" algn="r">
+              <a:lnSpc>
+                <a:spcPct val="100000"/>
+              </a:lnSpc>
               <a:buNone/>
+              <a:tabLst>
+                <a:tab algn="l" pos="0"/>
+              </a:tabLst>
               <a:defRPr b="0" lang="en-AU" sz="1400" strike="noStrike" u="none">
                 <a:solidFill>
                   <a:srgbClr val="ffffff"/>
@@ -3304,9 +3512,15 @@
           </a:lstStyle>
           <a:p>
             <a:pPr indent="0" algn="r">
+              <a:lnSpc>
+                <a:spcPct val="100000"/>
+              </a:lnSpc>
               <a:buNone/>
+              <a:tabLst>
+                <a:tab algn="l" pos="0"/>
+              </a:tabLst>
             </a:pPr>
-            <a:fld id="{7466BA7F-D5ED-45F4-95A4-4EEEA64AD85C}" type="slidenum">
+            <a:fld id="{1EF96E43-7269-44D7-9E92-32AA39112427}" type="slidenum">
               <a:rPr b="0" lang="en-AU" sz="1400" strike="noStrike" u="none">
                 <a:solidFill>
                   <a:srgbClr val="ffffff"/>
@@ -3319,11 +3533,11 @@
             </a:fld>
             <a:endParaRPr b="0" lang="en-AU" sz="1400" strike="noStrike" u="none">
               <a:solidFill>
-                <a:srgbClr val="ffffff"/>
+                <a:srgbClr val="000000"/>
               </a:solidFill>
               <a:effectLst/>
               <a:uFillTx/>
-              <a:latin typeface="Arial"/>
+              <a:latin typeface="Times New Roman"/>
             </a:endParaRPr>
           </a:p>
         </p:txBody>
@@ -3380,7 +3594,7 @@
       </p:grpSpPr>
       <p:sp>
         <p:nvSpPr>
-          <p:cNvPr id="18" name="PlaceHolder 1"/>
+          <p:cNvPr id="19" name="PlaceHolder 1"/>
           <p:cNvSpPr>
             <a:spLocks noGrp="1"/>
           </p:cNvSpPr>
@@ -3390,8 +3604,8 @@
         </p:nvSpPr>
         <p:spPr>
           <a:xfrm>
-            <a:off x="0" y="1620000"/>
-            <a:ext cx="9000000" cy="1080000"/>
+            <a:off x="0" y="1619640"/>
+            <a:ext cx="8999640" cy="1080360"/>
           </a:xfrm>
           <a:prstGeom prst="rect">
             <a:avLst/>
@@ -3407,7 +3621,13 @@
           </a:bodyPr>
           <a:p>
             <a:pPr indent="0" algn="ctr">
+              <a:lnSpc>
+                <a:spcPct val="100000"/>
+              </a:lnSpc>
               <a:buNone/>
+              <a:tabLst>
+                <a:tab algn="l" pos="0"/>
+              </a:tabLst>
             </a:pPr>
             <a:r>
               <a:rPr b="0" lang="en-AU" sz="3300" strike="noStrike" u="none">
@@ -3422,7 +3642,7 @@
             </a:r>
             <a:endParaRPr b="0" lang="en-AU" sz="3300" strike="noStrike" u="none">
               <a:solidFill>
-                <a:srgbClr val="dd4100"/>
+                <a:srgbClr val="000000"/>
               </a:solidFill>
               <a:effectLst/>
               <a:uFillTx/>
@@ -3463,7 +3683,7 @@
       </p:grpSpPr>
       <p:sp>
         <p:nvSpPr>
-          <p:cNvPr id="19" name="PlaceHolder 1"/>
+          <p:cNvPr id="20" name="PlaceHolder 1"/>
           <p:cNvSpPr>
             <a:spLocks noGrp="1"/>
           </p:cNvSpPr>
@@ -3473,8 +3693,8 @@
         </p:nvSpPr>
         <p:spPr>
           <a:xfrm>
-            <a:off x="360000" y="180000"/>
-            <a:ext cx="9360000" cy="478080"/>
+            <a:off x="360000" y="179640"/>
+            <a:ext cx="9359640" cy="478440"/>
           </a:xfrm>
           <a:prstGeom prst="rect">
             <a:avLst/>
@@ -3490,7 +3710,13 @@
           </a:bodyPr>
           <a:p>
             <a:pPr indent="0" algn="ctr">
+              <a:lnSpc>
+                <a:spcPct val="100000"/>
+              </a:lnSpc>
               <a:buNone/>
+              <a:tabLst>
+                <a:tab algn="l" pos="0"/>
+              </a:tabLst>
             </a:pPr>
             <a:r>
               <a:rPr b="0" lang="en-AU" sz="3300" strike="noStrike" u="none">
@@ -3505,7 +3731,7 @@
             </a:r>
             <a:endParaRPr b="0" lang="en-AU" sz="3300" strike="noStrike" u="none">
               <a:solidFill>
-                <a:srgbClr val="eeeeee"/>
+                <a:srgbClr val="000000"/>
               </a:solidFill>
               <a:effectLst/>
               <a:uFillTx/>
@@ -3516,7 +3742,7 @@
       </p:sp>
       <p:pic>
         <p:nvPicPr>
-          <p:cNvPr id="20" name="" descr=""/>
+          <p:cNvPr id="21" name="" descr=""/>
           <p:cNvPicPr/>
           <p:nvPr/>
         </p:nvPicPr>
@@ -3527,7 +3753,7 @@
         <p:spPr>
           <a:xfrm>
             <a:off x="628200" y="973800"/>
-            <a:ext cx="8849520" cy="3733920"/>
+            <a:ext cx="8849160" cy="3733560"/>
           </a:xfrm>
           <a:prstGeom prst="rect">
             <a:avLst/>
@@ -3552,7 +3778,7 @@
         <p:txBody>
           <a:bodyPr/>
           <a:p>
-            <a:fld id="{5703039B-A85C-4B9A-B72E-27258439FCB8}" type="slidenum">
+            <a:fld id="{BA7B01B1-9B68-4AAD-A4AC-9A8F965F4AEC}" type="slidenum">
               <a:t>2</a:t>
             </a:fld>
           </a:p>
@@ -3590,7 +3816,7 @@
       </p:grpSpPr>
       <p:sp>
         <p:nvSpPr>
-          <p:cNvPr id="21" name="PlaceHolder 1"/>
+          <p:cNvPr id="22" name="PlaceHolder 1"/>
           <p:cNvSpPr>
             <a:spLocks noGrp="1"/>
           </p:cNvSpPr>
@@ -3600,8 +3826,8 @@
         </p:nvSpPr>
         <p:spPr>
           <a:xfrm>
-            <a:off x="360000" y="180000"/>
-            <a:ext cx="9360000" cy="478080"/>
+            <a:off x="360000" y="179640"/>
+            <a:ext cx="9359640" cy="478440"/>
           </a:xfrm>
           <a:prstGeom prst="rect">
             <a:avLst/>
@@ -3617,7 +3843,13 @@
           </a:bodyPr>
           <a:p>
             <a:pPr indent="0" algn="ctr">
+              <a:lnSpc>
+                <a:spcPct val="100000"/>
+              </a:lnSpc>
               <a:buNone/>
+              <a:tabLst>
+                <a:tab algn="l" pos="0"/>
+              </a:tabLst>
             </a:pPr>
             <a:r>
               <a:rPr b="0" lang="en-AU" sz="3300" strike="noStrike" u="none">
@@ -3632,7 +3864,7 @@
             </a:r>
             <a:endParaRPr b="0" lang="en-AU" sz="3300" strike="noStrike" u="none">
               <a:solidFill>
-                <a:srgbClr val="eeeeee"/>
+                <a:srgbClr val="000000"/>
               </a:solidFill>
               <a:effectLst/>
               <a:uFillTx/>
@@ -3643,7 +3875,7 @@
       </p:sp>
       <p:pic>
         <p:nvPicPr>
-          <p:cNvPr id="22" name="" descr=""/>
+          <p:cNvPr id="23" name="" descr=""/>
           <p:cNvPicPr/>
           <p:nvPr/>
         </p:nvPicPr>
@@ -3654,7 +3886,7 @@
         <p:spPr>
           <a:xfrm>
             <a:off x="1566360" y="1507320"/>
-            <a:ext cx="6972840" cy="2666880"/>
+            <a:ext cx="6972480" cy="2666520"/>
           </a:xfrm>
           <a:prstGeom prst="rect">
             <a:avLst/>
@@ -3679,7 +3911,7 @@
         <p:txBody>
           <a:bodyPr/>
           <a:p>
-            <a:fld id="{BC8E86FF-C037-4503-9F19-F795E251ED66}" type="slidenum">
+            <a:fld id="{482A15C5-67D9-4AFF-82ED-4CBEB1F817DD}" type="slidenum">
               <a:t>3</a:t>
             </a:fld>
           </a:p>
@@ -3717,7 +3949,7 @@
       </p:grpSpPr>
       <p:sp>
         <p:nvSpPr>
-          <p:cNvPr id="23" name="PlaceHolder 1"/>
+          <p:cNvPr id="24" name="PlaceHolder 1"/>
           <p:cNvSpPr>
             <a:spLocks noGrp="1"/>
           </p:cNvSpPr>
@@ -3727,8 +3959,8 @@
         </p:nvSpPr>
         <p:spPr>
           <a:xfrm>
-            <a:off x="360000" y="180000"/>
-            <a:ext cx="9360000" cy="478080"/>
+            <a:off x="360000" y="179640"/>
+            <a:ext cx="9359640" cy="478440"/>
           </a:xfrm>
           <a:prstGeom prst="rect">
             <a:avLst/>
@@ -3744,7 +3976,13 @@
           </a:bodyPr>
           <a:p>
             <a:pPr indent="0" algn="ctr">
+              <a:lnSpc>
+                <a:spcPct val="100000"/>
+              </a:lnSpc>
               <a:buNone/>
+              <a:tabLst>
+                <a:tab algn="l" pos="0"/>
+              </a:tabLst>
             </a:pPr>
             <a:r>
               <a:rPr b="0" lang="en-AU" sz="3300" strike="noStrike" u="none">
@@ -3759,7 +3997,7 @@
             </a:r>
             <a:endParaRPr b="0" lang="en-AU" sz="3300" strike="noStrike" u="none">
               <a:solidFill>
-                <a:srgbClr val="eeeeee"/>
+                <a:srgbClr val="000000"/>
               </a:solidFill>
               <a:effectLst/>
               <a:uFillTx/>
@@ -3770,7 +4008,7 @@
       </p:sp>
       <p:sp>
         <p:nvSpPr>
-          <p:cNvPr id="24" name="PlaceHolder 2"/>
+          <p:cNvPr id="25" name="PlaceHolder 2"/>
           <p:cNvSpPr>
             <a:spLocks noGrp="1"/>
           </p:cNvSpPr>
@@ -3781,7 +4019,7 @@
         <p:spPr>
           <a:xfrm>
             <a:off x="360000" y="1080000"/>
-            <a:ext cx="9360000" cy="3600000"/>
+            <a:ext cx="9359640" cy="3599640"/>
           </a:xfrm>
           <a:prstGeom prst="rect">
             <a:avLst/>
@@ -3797,6 +4035,9 @@
           </a:bodyPr>
           <a:p>
             <a:pPr marL="432000" indent="-324000">
+              <a:lnSpc>
+                <a:spcPct val="100000"/>
+              </a:lnSpc>
               <a:spcBef>
                 <a:spcPts val="1060"/>
               </a:spcBef>
@@ -3820,7 +4061,7 @@
             </a:r>
             <a:endParaRPr b="0" lang="en-AU" sz="2400" strike="noStrike" u="none">
               <a:solidFill>
-                <a:srgbClr val="009bdd"/>
+                <a:srgbClr val="000000"/>
               </a:solidFill>
               <a:effectLst/>
               <a:uFillTx/>
@@ -3829,6 +4070,9 @@
           </a:p>
           <a:p>
             <a:pPr lvl="1" marL="864000" indent="-324000">
+              <a:lnSpc>
+                <a:spcPct val="100000"/>
+              </a:lnSpc>
               <a:spcBef>
                 <a:spcPts val="850"/>
               </a:spcBef>
@@ -3852,7 +4096,7 @@
             </a:r>
             <a:endParaRPr b="0" lang="en-AU" sz="2100" strike="noStrike" u="none">
               <a:solidFill>
-                <a:srgbClr val="009bdd"/>
+                <a:srgbClr val="000000"/>
               </a:solidFill>
               <a:effectLst/>
               <a:uFillTx/>
@@ -3861,6 +4105,9 @@
           </a:p>
           <a:p>
             <a:pPr lvl="1" marL="864000" indent="-324000">
+              <a:lnSpc>
+                <a:spcPct val="100000"/>
+              </a:lnSpc>
               <a:spcBef>
                 <a:spcPts val="850"/>
               </a:spcBef>
@@ -3884,7 +4131,7 @@
             </a:r>
             <a:endParaRPr b="0" lang="en-AU" sz="2100" strike="noStrike" u="none">
               <a:solidFill>
-                <a:srgbClr val="009bdd"/>
+                <a:srgbClr val="000000"/>
               </a:solidFill>
               <a:effectLst/>
               <a:uFillTx/>
@@ -3893,6 +4140,9 @@
           </a:p>
           <a:p>
             <a:pPr marL="432000" indent="-324000">
+              <a:lnSpc>
+                <a:spcPct val="100000"/>
+              </a:lnSpc>
               <a:spcBef>
                 <a:spcPts val="1060"/>
               </a:spcBef>
@@ -3916,7 +4166,7 @@
             </a:r>
             <a:endParaRPr b="0" lang="en-AU" sz="2400" strike="noStrike" u="none">
               <a:solidFill>
-                <a:srgbClr val="009bdd"/>
+                <a:srgbClr val="000000"/>
               </a:solidFill>
               <a:effectLst/>
               <a:uFillTx/>
@@ -3925,6 +4175,9 @@
           </a:p>
           <a:p>
             <a:pPr marL="432000" indent="-324000">
+              <a:lnSpc>
+                <a:spcPct val="100000"/>
+              </a:lnSpc>
               <a:spcBef>
                 <a:spcPts val="1060"/>
               </a:spcBef>
@@ -3948,7 +4201,7 @@
             </a:r>
             <a:endParaRPr b="0" lang="en-AU" sz="2400" strike="noStrike" u="none">
               <a:solidFill>
-                <a:srgbClr val="009bdd"/>
+                <a:srgbClr val="000000"/>
               </a:solidFill>
               <a:effectLst/>
               <a:uFillTx/>
@@ -3971,7 +4224,7 @@
         <p:txBody>
           <a:bodyPr/>
           <a:p>
-            <a:fld id="{51FDF2A1-A8EA-4BFA-8963-BD5C71ECC4D9}" type="slidenum">
+            <a:fld id="{5567733B-1234-4622-8481-0E1101738CC1}" type="slidenum">
               <a:t>4</a:t>
             </a:fld>
           </a:p>
@@ -4009,7 +4262,7 @@
       </p:grpSpPr>
       <p:sp>
         <p:nvSpPr>
-          <p:cNvPr id="25" name="PlaceHolder 1"/>
+          <p:cNvPr id="26" name="PlaceHolder 1"/>
           <p:cNvSpPr>
             <a:spLocks noGrp="1"/>
           </p:cNvSpPr>
@@ -4019,8 +4272,8 @@
         </p:nvSpPr>
         <p:spPr>
           <a:xfrm>
-            <a:off x="360000" y="180000"/>
-            <a:ext cx="9360000" cy="478080"/>
+            <a:off x="360000" y="179640"/>
+            <a:ext cx="9359640" cy="478440"/>
           </a:xfrm>
           <a:prstGeom prst="rect">
             <a:avLst/>
@@ -4036,7 +4289,13 @@
           </a:bodyPr>
           <a:p>
             <a:pPr indent="0" algn="ctr">
+              <a:lnSpc>
+                <a:spcPct val="100000"/>
+              </a:lnSpc>
               <a:buNone/>
+              <a:tabLst>
+                <a:tab algn="l" pos="0"/>
+              </a:tabLst>
             </a:pPr>
             <a:r>
               <a:rPr b="0" lang="en-AU" sz="3300" strike="noStrike" u="none">
@@ -4051,7 +4310,7 @@
             </a:r>
             <a:endParaRPr b="0" lang="en-AU" sz="3300" strike="noStrike" u="none">
               <a:solidFill>
-                <a:srgbClr val="eeeeee"/>
+                <a:srgbClr val="000000"/>
               </a:solidFill>
               <a:effectLst/>
               <a:uFillTx/>
@@ -4062,7 +4321,7 @@
       </p:sp>
       <p:sp>
         <p:nvSpPr>
-          <p:cNvPr id="26" name="PlaceHolder 2"/>
+          <p:cNvPr id="27" name="PlaceHolder 2"/>
           <p:cNvSpPr>
             <a:spLocks noGrp="1"/>
           </p:cNvSpPr>
@@ -4073,7 +4332,7 @@
         <p:spPr>
           <a:xfrm>
             <a:off x="360000" y="1080000"/>
-            <a:ext cx="9360000" cy="3600000"/>
+            <a:ext cx="9359640" cy="3599640"/>
           </a:xfrm>
           <a:prstGeom prst="rect">
             <a:avLst/>
@@ -4089,6 +4348,9 @@
           </a:bodyPr>
           <a:p>
             <a:pPr marL="432000" indent="-324000">
+              <a:lnSpc>
+                <a:spcPct val="100000"/>
+              </a:lnSpc>
               <a:spcBef>
                 <a:spcPts val="1060"/>
               </a:spcBef>
@@ -4112,7 +4374,7 @@
             </a:r>
             <a:endParaRPr b="0" lang="en-AU" sz="2400" strike="noStrike" u="none">
               <a:solidFill>
-                <a:srgbClr val="009bdd"/>
+                <a:srgbClr val="000000"/>
               </a:solidFill>
               <a:effectLst/>
               <a:uFillTx/>
@@ -4121,6 +4383,9 @@
           </a:p>
           <a:p>
             <a:pPr marL="432000" indent="-324000">
+              <a:lnSpc>
+                <a:spcPct val="100000"/>
+              </a:lnSpc>
               <a:spcBef>
                 <a:spcPts val="1060"/>
               </a:spcBef>
@@ -4144,7 +4409,7 @@
             </a:r>
             <a:endParaRPr b="0" lang="en-AU" sz="2400" strike="noStrike" u="none">
               <a:solidFill>
-                <a:srgbClr val="009bdd"/>
+                <a:srgbClr val="000000"/>
               </a:solidFill>
               <a:effectLst/>
               <a:uFillTx/>
@@ -4153,6 +4418,9 @@
           </a:p>
           <a:p>
             <a:pPr marL="432000" indent="-324000">
+              <a:lnSpc>
+                <a:spcPct val="100000"/>
+              </a:lnSpc>
               <a:spcBef>
                 <a:spcPts val="1060"/>
               </a:spcBef>
@@ -4176,7 +4444,7 @@
             </a:r>
             <a:endParaRPr b="0" lang="en-AU" sz="2400" strike="noStrike" u="none">
               <a:solidFill>
-                <a:srgbClr val="009bdd"/>
+                <a:srgbClr val="000000"/>
               </a:solidFill>
               <a:effectLst/>
               <a:uFillTx/>
@@ -4199,7 +4467,7 @@
         <p:txBody>
           <a:bodyPr/>
           <a:p>
-            <a:fld id="{921A578F-282E-41F8-90BF-F792B877B8C1}" type="slidenum">
+            <a:fld id="{49ECD520-3A36-4DD4-811A-1FEA4687920D}" type="slidenum">
               <a:t>5</a:t>
             </a:fld>
           </a:p>
@@ -4237,7 +4505,7 @@
       </p:grpSpPr>
       <p:sp>
         <p:nvSpPr>
-          <p:cNvPr id="27" name="PlaceHolder 1"/>
+          <p:cNvPr id="28" name="PlaceHolder 1"/>
           <p:cNvSpPr>
             <a:spLocks noGrp="1"/>
           </p:cNvSpPr>
@@ -4247,8 +4515,8 @@
         </p:nvSpPr>
         <p:spPr>
           <a:xfrm>
-            <a:off x="360000" y="180000"/>
-            <a:ext cx="9360000" cy="478080"/>
+            <a:off x="360000" y="179640"/>
+            <a:ext cx="9359640" cy="478440"/>
           </a:xfrm>
           <a:prstGeom prst="rect">
             <a:avLst/>
@@ -4264,7 +4532,13 @@
           </a:bodyPr>
           <a:p>
             <a:pPr indent="0" algn="ctr">
+              <a:lnSpc>
+                <a:spcPct val="100000"/>
+              </a:lnSpc>
               <a:buNone/>
+              <a:tabLst>
+                <a:tab algn="l" pos="0"/>
+              </a:tabLst>
             </a:pPr>
             <a:r>
               <a:rPr b="0" lang="en-AU" sz="3300" strike="noStrike" u="none">
@@ -4279,7 +4553,7 @@
             </a:r>
             <a:endParaRPr b="0" lang="en-AU" sz="3300" strike="noStrike" u="none">
               <a:solidFill>
-                <a:srgbClr val="eeeeee"/>
+                <a:srgbClr val="000000"/>
               </a:solidFill>
               <a:effectLst/>
               <a:uFillTx/>
@@ -4290,7 +4564,7 @@
       </p:sp>
       <p:pic>
         <p:nvPicPr>
-          <p:cNvPr id="28" name="" descr=""/>
+          <p:cNvPr id="29" name="" descr=""/>
           <p:cNvPicPr/>
           <p:nvPr/>
         </p:nvPicPr>
@@ -4301,7 +4575,7 @@
         <p:spPr>
           <a:xfrm>
             <a:off x="1428480" y="1198800"/>
-            <a:ext cx="7248960" cy="3638520"/>
+            <a:ext cx="7248600" cy="3638160"/>
           </a:xfrm>
           <a:prstGeom prst="rect">
             <a:avLst/>
@@ -4326,7 +4600,7 @@
         <p:txBody>
           <a:bodyPr/>
           <a:p>
-            <a:fld id="{E0ADF14F-EC21-48D0-BE6C-2741649FE228}" type="slidenum">
+            <a:fld id="{39E1E5D5-E926-4DFA-B433-3905CBEE2562}" type="slidenum">
               <a:t>6</a:t>
             </a:fld>
           </a:p>
@@ -4364,7 +4638,7 @@
       </p:grpSpPr>
       <p:sp>
         <p:nvSpPr>
-          <p:cNvPr id="29" name="PlaceHolder 1"/>
+          <p:cNvPr id="30" name="PlaceHolder 1"/>
           <p:cNvSpPr>
             <a:spLocks noGrp="1"/>
           </p:cNvSpPr>
@@ -4374,8 +4648,8 @@
         </p:nvSpPr>
         <p:spPr>
           <a:xfrm>
-            <a:off x="360000" y="180000"/>
-            <a:ext cx="9360000" cy="478080"/>
+            <a:off x="360000" y="179640"/>
+            <a:ext cx="9359640" cy="478440"/>
           </a:xfrm>
           <a:prstGeom prst="rect">
             <a:avLst/>
@@ -4391,7 +4665,13 @@
           </a:bodyPr>
           <a:p>
             <a:pPr indent="0" algn="ctr">
+              <a:lnSpc>
+                <a:spcPct val="100000"/>
+              </a:lnSpc>
               <a:buNone/>
+              <a:tabLst>
+                <a:tab algn="l" pos="0"/>
+              </a:tabLst>
             </a:pPr>
             <a:r>
               <a:rPr b="0" lang="en-AU" sz="3300" strike="noStrike" u="none">
@@ -4406,7 +4686,7 @@
             </a:r>
             <a:endParaRPr b="0" lang="en-AU" sz="3300" strike="noStrike" u="none">
               <a:solidFill>
-                <a:srgbClr val="eeeeee"/>
+                <a:srgbClr val="000000"/>
               </a:solidFill>
               <a:effectLst/>
               <a:uFillTx/>
@@ -4417,7 +4697,7 @@
       </p:sp>
       <p:pic>
         <p:nvPicPr>
-          <p:cNvPr id="30" name="" descr=""/>
+          <p:cNvPr id="31" name="" descr=""/>
           <p:cNvPicPr/>
           <p:nvPr/>
         </p:nvPicPr>
@@ -4428,7 +4708,7 @@
         <p:spPr>
           <a:xfrm>
             <a:off x="1175760" y="784440"/>
-            <a:ext cx="7354080" cy="4236840"/>
+            <a:ext cx="7353720" cy="4236480"/>
           </a:xfrm>
           <a:prstGeom prst="rect">
             <a:avLst/>
@@ -4453,7 +4733,7 @@
         <p:txBody>
           <a:bodyPr/>
           <a:p>
-            <a:fld id="{73402952-EBC4-45CC-800F-FFB94B2A8983}" type="slidenum">
+            <a:fld id="{0BADB07C-DAFD-4B1C-A3B0-9ED030568626}" type="slidenum">
               <a:t>7</a:t>
             </a:fld>
           </a:p>
@@ -4491,7 +4771,7 @@
       </p:grpSpPr>
       <p:sp>
         <p:nvSpPr>
-          <p:cNvPr id="31" name="PlaceHolder 1"/>
+          <p:cNvPr id="32" name="PlaceHolder 1"/>
           <p:cNvSpPr>
             <a:spLocks noGrp="1"/>
           </p:cNvSpPr>
@@ -4501,8 +4781,8 @@
         </p:nvSpPr>
         <p:spPr>
           <a:xfrm>
-            <a:off x="360000" y="180000"/>
-            <a:ext cx="9360000" cy="478080"/>
+            <a:off x="360000" y="167400"/>
+            <a:ext cx="9359640" cy="503280"/>
           </a:xfrm>
           <a:prstGeom prst="rect">
             <a:avLst/>
@@ -4518,7 +4798,13 @@
           </a:bodyPr>
           <a:p>
             <a:pPr indent="0" algn="ctr">
+              <a:lnSpc>
+                <a:spcPct val="100000"/>
+              </a:lnSpc>
               <a:buNone/>
+              <a:tabLst>
+                <a:tab algn="l" pos="0"/>
+              </a:tabLst>
             </a:pPr>
             <a:r>
               <a:rPr b="0" lang="en-AU" sz="3300" strike="noStrike" u="none">
@@ -4529,11 +4815,11 @@
                 <a:uFillTx/>
                 <a:latin typeface="Arial"/>
               </a:rPr>
-              <a:t>Comparison</a:t>
+              <a:t>Risk Factors</a:t>
             </a:r>
             <a:endParaRPr b="0" lang="en-AU" sz="3300" strike="noStrike" u="none">
               <a:solidFill>
-                <a:srgbClr val="eeeeee"/>
+                <a:srgbClr val="000000"/>
               </a:solidFill>
               <a:effectLst/>
               <a:uFillTx/>
@@ -4544,13 +4830,13 @@
       </p:sp>
       <p:graphicFrame>
         <p:nvGraphicFramePr>
-          <p:cNvPr id="32" name=""/>
+          <p:cNvPr id="33" name=""/>
           <p:cNvGraphicFramePr/>
           <p:nvPr/>
         </p:nvGraphicFramePr>
         <p:xfrm>
-          <a:off x="1515960" y="1267200"/>
-          <a:ext cx="7768080" cy="2757960"/>
+          <a:off x="434880" y="1290600"/>
+          <a:ext cx="7767720" cy="3299400"/>
         </p:xfrm>
         <a:graphic>
           <a:graphicData uri="http://schemas.openxmlformats.org/drawingml/2006/table">
@@ -4558,13 +4844,14 @@
               <a:tblPr/>
               <a:tblGrid>
                 <a:gridCol w="2589120"/>
-                <a:gridCol w="2589120"/>
-                <a:gridCol w="2589840"/>
+                <a:gridCol w="2154240"/>
+                <a:gridCol w="2107440"/>
+                <a:gridCol w="2286000"/>
               </a:tblGrid>
               <a:tr h="538560">
                 <a:tc>
                   <a:txBody>
-                    <a:bodyPr lIns="36000" rIns="36000" tIns="36000" bIns="36000" anchor="t">
+                    <a:bodyPr lIns="36000" rIns="36000" anchor="t">
                       <a:noAutofit/>
                     </a:bodyPr>
                     <a:p>
@@ -4608,10 +4895,15 @@
                 </a:tc>
                 <a:tc>
                   <a:txBody>
-                    <a:bodyPr lIns="36000" rIns="36000" tIns="36000" bIns="36000" anchor="t">
+                    <a:bodyPr lIns="36000" rIns="36000" anchor="t">
                       <a:noAutofit/>
                     </a:bodyPr>
                     <a:p>
+                      <a:pPr>
+                        <a:lnSpc>
+                          <a:spcPct val="100000"/>
+                        </a:lnSpc>
+                      </a:pPr>
                       <a:r>
                         <a:rPr b="0" lang="en-AU" sz="1800" strike="noStrike" u="none">
                           <a:solidFill>
@@ -4621,7 +4913,7 @@
                           <a:uFillTx/>
                           <a:latin typeface="Arial"/>
                         </a:rPr>
-                        <a:t>On-prem</a:t>
+                        <a:t>On-prem / IaaS</a:t>
                       </a:r>
                       <a:endParaRPr b="0" lang="en-AU" sz="1800" strike="noStrike" u="none">
                         <a:solidFill>
@@ -4652,18 +4944,24 @@
                       </a:solidFill>
                       <a:prstDash val="solid"/>
                     </a:lnT>
-                    <a:lnB>
+                    <a:lnB w="12240">
                       <a:noFill/>
+                      <a:prstDash val="solid"/>
                     </a:lnB>
                     <a:noFill/>
                   </a:tcPr>
                 </a:tc>
                 <a:tc>
                   <a:txBody>
-                    <a:bodyPr lIns="36000" rIns="36000" tIns="36000" bIns="36000" anchor="t">
+                    <a:bodyPr lIns="36000" rIns="36000" anchor="t">
                       <a:noAutofit/>
                     </a:bodyPr>
                     <a:p>
+                      <a:pPr>
+                        <a:lnSpc>
+                          <a:spcPct val="100000"/>
+                        </a:lnSpc>
+                      </a:pPr>
                       <a:r>
                         <a:rPr b="0" lang="en-AU" sz="1800" strike="noStrike" u="none">
                           <a:solidFill>
@@ -4673,7 +4971,7 @@
                           <a:uFillTx/>
                           <a:latin typeface="Arial"/>
                         </a:rPr>
-                        <a:t>AWS</a:t>
+                        <a:t>SaaS</a:t>
                       </a:r>
                       <a:endParaRPr b="0" lang="en-AU" sz="1800" strike="noStrike" u="none">
                         <a:solidFill>
@@ -4704,8 +5002,62 @@
                       </a:solidFill>
                       <a:prstDash val="solid"/>
                     </a:lnT>
-                    <a:lnB>
+                    <a:lnB w="12240">
                       <a:noFill/>
+                      <a:prstDash val="solid"/>
+                    </a:lnB>
+                    <a:noFill/>
+                  </a:tcPr>
+                </a:tc>
+                <a:tc>
+                  <a:txBody>
+                    <a:bodyPr lIns="36000" rIns="36000" anchor="t">
+                      <a:noAutofit/>
+                    </a:bodyPr>
+                    <a:p>
+                      <a:r>
+                        <a:rPr b="0" lang="en-AU" sz="1800" strike="noStrike" u="none">
+                          <a:solidFill>
+                            <a:srgbClr val="000000"/>
+                          </a:solidFill>
+                          <a:effectLst/>
+                          <a:uFillTx/>
+                          <a:latin typeface="Arial"/>
+                        </a:rPr>
+                        <a:t>REST API</a:t>
+                      </a:r>
+                      <a:endParaRPr b="0" lang="en-AU" sz="1800" strike="noStrike" u="none">
+                        <a:solidFill>
+                          <a:srgbClr val="000000"/>
+                        </a:solidFill>
+                        <a:effectLst/>
+                        <a:uFillTx/>
+                        <a:latin typeface="Arial"/>
+                      </a:endParaRPr>
+                    </a:p>
+                  </a:txBody>
+                  <a:tcPr anchor="t" marL="36000" marR="36000">
+                    <a:lnL w="7200">
+                      <a:solidFill>
+                        <a:srgbClr val="000000"/>
+                      </a:solidFill>
+                      <a:prstDash val="solid"/>
+                    </a:lnL>
+                    <a:lnR w="7200">
+                      <a:solidFill>
+                        <a:srgbClr val="000000"/>
+                      </a:solidFill>
+                      <a:prstDash val="solid"/>
+                    </a:lnR>
+                    <a:lnT w="7200">
+                      <a:solidFill>
+                        <a:srgbClr val="000000"/>
+                      </a:solidFill>
+                      <a:prstDash val="solid"/>
+                    </a:lnT>
+                    <a:lnB w="12240">
+                      <a:noFill/>
+                      <a:prstDash val="solid"/>
                     </a:lnB>
                     <a:noFill/>
                   </a:tcPr>
@@ -4714,10 +5066,15 @@
               <a:tr h="538560">
                 <a:tc>
                   <a:txBody>
-                    <a:bodyPr lIns="36000" rIns="36000" tIns="36000" bIns="36000" anchor="t">
+                    <a:bodyPr lIns="36000" rIns="36000" anchor="t">
                       <a:noAutofit/>
                     </a:bodyPr>
                     <a:p>
+                      <a:pPr>
+                        <a:lnSpc>
+                          <a:spcPct val="100000"/>
+                        </a:lnSpc>
+                      </a:pPr>
                       <a:r>
                         <a:rPr b="0" lang="en-AU" sz="1800" strike="noStrike" u="none">
                           <a:solidFill>
@@ -4746,8 +5103,9 @@
                       </a:solidFill>
                       <a:prstDash val="solid"/>
                     </a:lnL>
-                    <a:lnR>
+                    <a:lnR w="12240">
                       <a:noFill/>
+                      <a:prstDash val="solid"/>
                     </a:lnR>
                     <a:lnT w="7200">
                       <a:solidFill>
@@ -4766,7 +5124,7 @@
                 </a:tc>
                 <a:tc>
                   <a:txBody>
-                    <a:bodyPr lIns="36000" rIns="36000" tIns="36000" bIns="36000" anchor="t">
+                    <a:bodyPr lIns="36000" rIns="36000" anchor="t">
                       <a:noAutofit/>
                     </a:bodyPr>
                     <a:p>
@@ -4812,7 +5170,7 @@
                 </a:tc>
                 <a:tc>
                   <a:txBody>
-                    <a:bodyPr lIns="36000" rIns="36000" tIns="36000" bIns="36000" anchor="t">
+                    <a:bodyPr lIns="36000" rIns="36000" anchor="t">
                       <a:noAutofit/>
                     </a:bodyPr>
                     <a:p>
@@ -4827,8 +5185,53 @@
                     </a:p>
                   </a:txBody>
                   <a:tcPr anchor="t" marL="36000" marR="36000">
-                    <a:lnL>
+                    <a:lnL w="12240">
                       <a:noFill/>
+                      <a:prstDash val="solid"/>
+                    </a:lnL>
+                    <a:lnR w="7200">
+                      <a:solidFill>
+                        <a:srgbClr val="000000"/>
+                      </a:solidFill>
+                      <a:prstDash val="solid"/>
+                    </a:lnR>
+                    <a:lnT w="7200">
+                      <a:solidFill>
+                        <a:srgbClr val="000000"/>
+                      </a:solidFill>
+                      <a:prstDash val="solid"/>
+                    </a:lnT>
+                    <a:lnB w="7200">
+                      <a:solidFill>
+                        <a:srgbClr val="000000"/>
+                      </a:solidFill>
+                      <a:prstDash val="solid"/>
+                    </a:lnB>
+                    <a:solidFill>
+                      <a:srgbClr val="ff0000"/>
+                    </a:solidFill>
+                  </a:tcPr>
+                </a:tc>
+                <a:tc>
+                  <a:txBody>
+                    <a:bodyPr lIns="36000" rIns="36000" anchor="t">
+                      <a:noAutofit/>
+                    </a:bodyPr>
+                    <a:p>
+                      <a:endParaRPr b="0" lang="en-AU" sz="1800" strike="noStrike" u="none">
+                        <a:solidFill>
+                          <a:srgbClr val="ffffff"/>
+                        </a:solidFill>
+                        <a:effectLst/>
+                        <a:uFillTx/>
+                        <a:latin typeface="Arial"/>
+                      </a:endParaRPr>
+                    </a:p>
+                  </a:txBody>
+                  <a:tcPr anchor="t" marL="36000" marR="36000">
+                    <a:lnL w="12240">
+                      <a:noFill/>
+                      <a:prstDash val="solid"/>
                     </a:lnL>
                     <a:lnR w="7200">
                       <a:solidFill>
@@ -4857,10 +5260,15 @@
               <a:tr h="538560">
                 <a:tc>
                   <a:txBody>
-                    <a:bodyPr lIns="36000" rIns="36000" tIns="36000" bIns="36000" anchor="t">
+                    <a:bodyPr lIns="36000" rIns="36000" anchor="t">
                       <a:noAutofit/>
                     </a:bodyPr>
                     <a:p>
+                      <a:pPr>
+                        <a:lnSpc>
+                          <a:spcPct val="100000"/>
+                        </a:lnSpc>
+                      </a:pPr>
                       <a:r>
                         <a:rPr b="0" lang="en-AU" sz="1800" strike="noStrike" u="none">
                           <a:solidFill>
@@ -4889,8 +5297,9 @@
                       </a:solidFill>
                       <a:prstDash val="solid"/>
                     </a:lnL>
-                    <a:lnR>
+                    <a:lnR w="12240">
                       <a:noFill/>
+                      <a:prstDash val="solid"/>
                     </a:lnR>
                     <a:lnT w="7200">
                       <a:solidFill>
@@ -4909,7 +5318,7 @@
                 </a:tc>
                 <a:tc>
                   <a:txBody>
-                    <a:bodyPr lIns="36000" rIns="36000" tIns="36000" bIns="36000" anchor="t">
+                    <a:bodyPr lIns="36000" rIns="36000" anchor="t">
                       <a:noAutofit/>
                     </a:bodyPr>
                     <a:p>
@@ -4936,8 +5345,9 @@
                       </a:solidFill>
                       <a:prstDash val="solid"/>
                     </a:lnR>
-                    <a:lnT>
+                    <a:lnT w="12240">
                       <a:noFill/>
+                      <a:prstDash val="solid"/>
                     </a:lnT>
                     <a:lnB w="7200">
                       <a:solidFill>
@@ -4952,7 +5362,7 @@
                 </a:tc>
                 <a:tc>
                   <a:txBody>
-                    <a:bodyPr lIns="36000" rIns="36000" tIns="36000" bIns="36000" anchor="t">
+                    <a:bodyPr lIns="36000" rIns="36000" anchor="t">
                       <a:noAutofit/>
                     </a:bodyPr>
                     <a:p>
@@ -4967,8 +5377,9 @@
                     </a:p>
                   </a:txBody>
                   <a:tcPr anchor="t" marL="36000" marR="36000">
-                    <a:lnL>
+                    <a:lnL w="12240">
                       <a:noFill/>
+                      <a:prstDash val="solid"/>
                     </a:lnL>
                     <a:lnR w="7200">
                       <a:solidFill>
@@ -4976,8 +5387,51 @@
                       </a:solidFill>
                       <a:prstDash val="solid"/>
                     </a:lnR>
-                    <a:lnT>
+                    <a:lnT w="12240">
                       <a:noFill/>
+                      <a:prstDash val="solid"/>
+                    </a:lnT>
+                    <a:lnB w="7200">
+                      <a:solidFill>
+                        <a:srgbClr val="000000"/>
+                      </a:solidFill>
+                      <a:prstDash val="solid"/>
+                    </a:lnB>
+                    <a:solidFill>
+                      <a:srgbClr val="81d41a"/>
+                    </a:solidFill>
+                  </a:tcPr>
+                </a:tc>
+                <a:tc>
+                  <a:txBody>
+                    <a:bodyPr lIns="36000" rIns="36000" anchor="t">
+                      <a:noAutofit/>
+                    </a:bodyPr>
+                    <a:p>
+                      <a:endParaRPr b="0" lang="en-AU" sz="1800" strike="noStrike" u="none">
+                        <a:solidFill>
+                          <a:srgbClr val="000000"/>
+                        </a:solidFill>
+                        <a:effectLst/>
+                        <a:uFillTx/>
+                        <a:latin typeface="Arial"/>
+                      </a:endParaRPr>
+                    </a:p>
+                  </a:txBody>
+                  <a:tcPr anchor="t" marL="36000" marR="36000">
+                    <a:lnL w="12240">
+                      <a:noFill/>
+                      <a:prstDash val="solid"/>
+                    </a:lnL>
+                    <a:lnR w="7200">
+                      <a:solidFill>
+                        <a:srgbClr val="000000"/>
+                      </a:solidFill>
+                      <a:prstDash val="solid"/>
+                    </a:lnR>
+                    <a:lnT w="12240">
+                      <a:noFill/>
+                      <a:prstDash val="solid"/>
                     </a:lnT>
                     <a:lnB w="7200">
                       <a:solidFill>
@@ -4994,10 +5448,15 @@
               <a:tr h="600840">
                 <a:tc>
                   <a:txBody>
-                    <a:bodyPr lIns="36000" rIns="36000" tIns="36000" bIns="36000" anchor="t">
+                    <a:bodyPr lIns="36000" rIns="36000" anchor="t">
                       <a:noAutofit/>
                     </a:bodyPr>
                     <a:p>
+                      <a:pPr>
+                        <a:lnSpc>
+                          <a:spcPct val="100000"/>
+                        </a:lnSpc>
+                      </a:pPr>
                       <a:r>
                         <a:rPr b="0" lang="en-AU" sz="1800" strike="noStrike" u="none">
                           <a:solidFill>
@@ -5026,8 +5485,9 @@
                       </a:solidFill>
                       <a:prstDash val="solid"/>
                     </a:lnL>
-                    <a:lnR>
+                    <a:lnR w="12240">
                       <a:noFill/>
+                      <a:prstDash val="solid"/>
                     </a:lnR>
                     <a:lnT w="7200">
                       <a:solidFill>
@@ -5046,7 +5506,7 @@
                 </a:tc>
                 <a:tc>
                   <a:txBody>
-                    <a:bodyPr lIns="36000" rIns="36000" tIns="36000" bIns="36000" anchor="t">
+                    <a:bodyPr lIns="36000" rIns="36000" anchor="t">
                       <a:noAutofit/>
                     </a:bodyPr>
                     <a:p>
@@ -5073,8 +5533,9 @@
                       </a:solidFill>
                       <a:prstDash val="solid"/>
                     </a:lnR>
-                    <a:lnT>
+                    <a:lnT w="12240">
                       <a:noFill/>
+                      <a:prstDash val="solid"/>
                     </a:lnT>
                     <a:lnB w="7200">
                       <a:solidFill>
@@ -5089,7 +5550,7 @@
                 </a:tc>
                 <a:tc>
                   <a:txBody>
-                    <a:bodyPr lIns="36000" rIns="36000" tIns="36000" bIns="36000" anchor="t">
+                    <a:bodyPr lIns="36000" rIns="36000" anchor="t">
                       <a:noAutofit/>
                     </a:bodyPr>
                     <a:p>
@@ -5104,8 +5565,9 @@
                     </a:p>
                   </a:txBody>
                   <a:tcPr anchor="t" marL="36000" marR="36000">
-                    <a:lnL>
+                    <a:lnL w="12240">
                       <a:noFill/>
+                      <a:prstDash val="solid"/>
                     </a:lnL>
                     <a:lnR w="7200">
                       <a:solidFill>
@@ -5113,8 +5575,9 @@
                       </a:solidFill>
                       <a:prstDash val="solid"/>
                     </a:lnR>
-                    <a:lnT>
+                    <a:lnT w="12240">
                       <a:noFill/>
+                      <a:prstDash val="solid"/>
                     </a:lnT>
                     <a:lnB w="7200">
                       <a:solidFill>
@@ -5124,6 +5587,48 @@
                     </a:lnB>
                     <a:solidFill>
                       <a:srgbClr val="ff0000"/>
+                    </a:solidFill>
+                  </a:tcPr>
+                </a:tc>
+                <a:tc>
+                  <a:txBody>
+                    <a:bodyPr lIns="36000" rIns="36000" anchor="t">
+                      <a:noAutofit/>
+                    </a:bodyPr>
+                    <a:p>
+                      <a:endParaRPr b="0" lang="en-AU" sz="1800" strike="noStrike" u="none">
+                        <a:solidFill>
+                          <a:srgbClr val="ffffff"/>
+                        </a:solidFill>
+                        <a:effectLst/>
+                        <a:uFillTx/>
+                        <a:latin typeface="Arial"/>
+                      </a:endParaRPr>
+                    </a:p>
+                  </a:txBody>
+                  <a:tcPr anchor="t" marL="36000" marR="36000">
+                    <a:lnL w="12240">
+                      <a:noFill/>
+                      <a:prstDash val="solid"/>
+                    </a:lnL>
+                    <a:lnR w="7200">
+                      <a:solidFill>
+                        <a:srgbClr val="000000"/>
+                      </a:solidFill>
+                      <a:prstDash val="solid"/>
+                    </a:lnR>
+                    <a:lnT w="12240">
+                      <a:noFill/>
+                      <a:prstDash val="solid"/>
+                    </a:lnT>
+                    <a:lnB w="7200">
+                      <a:solidFill>
+                        <a:srgbClr val="000000"/>
+                      </a:solidFill>
+                      <a:prstDash val="solid"/>
+                    </a:lnB>
+                    <a:solidFill>
+                      <a:srgbClr val="81d41a"/>
                     </a:solidFill>
                   </a:tcPr>
                 </a:tc>
@@ -5131,10 +5636,15 @@
               <a:tr h="541440">
                 <a:tc>
                   <a:txBody>
-                    <a:bodyPr lIns="36000" rIns="36000" tIns="36000" bIns="36000" anchor="t">
+                    <a:bodyPr lIns="36000" rIns="36000" anchor="t">
                       <a:noAutofit/>
                     </a:bodyPr>
                     <a:p>
+                      <a:pPr>
+                        <a:lnSpc>
+                          <a:spcPct val="100000"/>
+                        </a:lnSpc>
+                      </a:pPr>
                       <a:r>
                         <a:rPr b="0" lang="en-AU" sz="1800" strike="noStrike" u="none">
                           <a:solidFill>
@@ -5163,8 +5673,9 @@
                       </a:solidFill>
                       <a:prstDash val="solid"/>
                     </a:lnL>
-                    <a:lnR>
+                    <a:lnR w="12240">
                       <a:noFill/>
+                      <a:prstDash val="solid"/>
                     </a:lnR>
                     <a:lnT w="7200">
                       <a:solidFill>
@@ -5183,7 +5694,7 @@
                 </a:tc>
                 <a:tc>
                   <a:txBody>
-                    <a:bodyPr lIns="36000" rIns="36000" tIns="36000" bIns="36000" anchor="t">
+                    <a:bodyPr lIns="36000" rIns="36000" anchor="t">
                       <a:noAutofit/>
                     </a:bodyPr>
                     <a:p>
@@ -5210,8 +5721,9 @@
                       </a:solidFill>
                       <a:prstDash val="solid"/>
                     </a:lnR>
-                    <a:lnT>
+                    <a:lnT w="12240">
                       <a:noFill/>
+                      <a:prstDash val="solid"/>
                     </a:lnT>
                     <a:lnB w="7200">
                       <a:solidFill>
@@ -5226,7 +5738,7 @@
                 </a:tc>
                 <a:tc>
                   <a:txBody>
-                    <a:bodyPr lIns="36000" rIns="36000" tIns="36000" bIns="36000" anchor="t">
+                    <a:bodyPr lIns="36000" rIns="36000" anchor="t">
                       <a:noAutofit/>
                     </a:bodyPr>
                     <a:p>
@@ -5241,8 +5753,9 @@
                     </a:p>
                   </a:txBody>
                   <a:tcPr anchor="t" marL="36000" marR="36000">
-                    <a:lnL>
+                    <a:lnL w="12240">
                       <a:noFill/>
+                      <a:prstDash val="solid"/>
                     </a:lnL>
                     <a:lnR w="7200">
                       <a:solidFill>
@@ -5250,8 +5763,9 @@
                       </a:solidFill>
                       <a:prstDash val="solid"/>
                     </a:lnR>
-                    <a:lnT>
+                    <a:lnT w="12240">
                       <a:noFill/>
+                      <a:prstDash val="solid"/>
                     </a:lnT>
                     <a:lnB w="7200">
                       <a:solidFill>
@@ -5261,6 +5775,48 @@
                     </a:lnB>
                     <a:solidFill>
                       <a:srgbClr val="81d41a"/>
+                    </a:solidFill>
+                  </a:tcPr>
+                </a:tc>
+                <a:tc>
+                  <a:txBody>
+                    <a:bodyPr lIns="36000" rIns="36000" anchor="t">
+                      <a:noAutofit/>
+                    </a:bodyPr>
+                    <a:p>
+                      <a:endParaRPr b="0" lang="en-AU" sz="1800" strike="noStrike" u="none">
+                        <a:solidFill>
+                          <a:srgbClr val="000000"/>
+                        </a:solidFill>
+                        <a:effectLst/>
+                        <a:uFillTx/>
+                        <a:latin typeface="Arial"/>
+                      </a:endParaRPr>
+                    </a:p>
+                  </a:txBody>
+                  <a:tcPr anchor="t" marL="36000" marR="36000">
+                    <a:lnL w="12240">
+                      <a:noFill/>
+                      <a:prstDash val="solid"/>
+                    </a:lnL>
+                    <a:lnR w="7200">
+                      <a:solidFill>
+                        <a:srgbClr val="000000"/>
+                      </a:solidFill>
+                      <a:prstDash val="solid"/>
+                    </a:lnR>
+                    <a:lnT w="12240">
+                      <a:noFill/>
+                      <a:prstDash val="solid"/>
+                    </a:lnT>
+                    <a:lnB w="7200">
+                      <a:solidFill>
+                        <a:srgbClr val="000000"/>
+                      </a:solidFill>
+                      <a:prstDash val="solid"/>
+                    </a:lnB>
+                    <a:solidFill>
+                      <a:srgbClr val="ff0000"/>
                     </a:solidFill>
                   </a:tcPr>
                 </a:tc>
@@ -5268,10 +5824,15 @@
               <a:tr h="541440">
                 <a:tc>
                   <a:txBody>
-                    <a:bodyPr lIns="36000" rIns="36000" tIns="36000" bIns="36000" anchor="t">
+                    <a:bodyPr lIns="36000" rIns="36000" anchor="t">
                       <a:noAutofit/>
                     </a:bodyPr>
                     <a:p>
+                      <a:pPr>
+                        <a:lnSpc>
+                          <a:spcPct val="100000"/>
+                        </a:lnSpc>
+                      </a:pPr>
                       <a:r>
                         <a:rPr b="0" lang="en-AU" sz="1800" strike="noStrike" u="none">
                           <a:solidFill>
@@ -5281,7 +5842,7 @@
                           <a:uFillTx/>
                           <a:latin typeface="Arial"/>
                         </a:rPr>
-                        <a:t>Vendor Lock</a:t>
+                        <a:t>Portability</a:t>
                       </a:r>
                       <a:endParaRPr b="0" lang="en-AU" sz="1800" strike="noStrike" u="none">
                         <a:solidFill>
@@ -5300,8 +5861,9 @@
                       </a:solidFill>
                       <a:prstDash val="solid"/>
                     </a:lnL>
-                    <a:lnR>
+                    <a:lnR w="12240">
                       <a:noFill/>
+                      <a:prstDash val="solid"/>
                     </a:lnR>
                     <a:lnT w="7200">
                       <a:solidFill>
@@ -5320,7 +5882,7 @@
                 </a:tc>
                 <a:tc>
                   <a:txBody>
-                    <a:bodyPr lIns="36000" rIns="36000" tIns="36000" bIns="36000" anchor="t">
+                    <a:bodyPr lIns="36000" rIns="36000" anchor="t">
                       <a:noAutofit/>
                     </a:bodyPr>
                     <a:p>
@@ -5347,8 +5909,9 @@
                       </a:solidFill>
                       <a:prstDash val="solid"/>
                     </a:lnR>
-                    <a:lnT>
+                    <a:lnT w="12240">
                       <a:noFill/>
+                      <a:prstDash val="solid"/>
                     </a:lnT>
                     <a:lnB w="7200">
                       <a:solidFill>
@@ -5363,7 +5926,7 @@
                 </a:tc>
                 <a:tc>
                   <a:txBody>
-                    <a:bodyPr lIns="36000" rIns="36000" tIns="36000" bIns="36000" anchor="t">
+                    <a:bodyPr lIns="36000" rIns="36000" anchor="t">
                       <a:noAutofit/>
                     </a:bodyPr>
                     <a:p>
@@ -5378,8 +5941,9 @@
                     </a:p>
                   </a:txBody>
                   <a:tcPr anchor="t" marL="36000" marR="36000">
-                    <a:lnL>
+                    <a:lnL w="12240">
                       <a:noFill/>
+                      <a:prstDash val="solid"/>
                     </a:lnL>
                     <a:lnR w="7200">
                       <a:solidFill>
@@ -5387,8 +5951,9 @@
                       </a:solidFill>
                       <a:prstDash val="solid"/>
                     </a:lnR>
-                    <a:lnT>
+                    <a:lnT w="12240">
                       <a:noFill/>
+                      <a:prstDash val="solid"/>
                     </a:lnT>
                     <a:lnB w="7200">
                       <a:solidFill>
@@ -5398,6 +5963,48 @@
                     </a:lnB>
                     <a:solidFill>
                       <a:srgbClr val="ff0000"/>
+                    </a:solidFill>
+                  </a:tcPr>
+                </a:tc>
+                <a:tc>
+                  <a:txBody>
+                    <a:bodyPr lIns="36000" rIns="36000" anchor="t">
+                      <a:noAutofit/>
+                    </a:bodyPr>
+                    <a:p>
+                      <a:endParaRPr b="0" lang="en-AU" sz="1800" strike="noStrike" u="none">
+                        <a:solidFill>
+                          <a:srgbClr val="ffffff"/>
+                        </a:solidFill>
+                        <a:effectLst/>
+                        <a:uFillTx/>
+                        <a:latin typeface="Arial"/>
+                      </a:endParaRPr>
+                    </a:p>
+                  </a:txBody>
+                  <a:tcPr anchor="t" marL="36000" marR="36000">
+                    <a:lnL w="12240">
+                      <a:noFill/>
+                      <a:prstDash val="solid"/>
+                    </a:lnL>
+                    <a:lnR w="7200">
+                      <a:solidFill>
+                        <a:srgbClr val="000000"/>
+                      </a:solidFill>
+                      <a:prstDash val="solid"/>
+                    </a:lnR>
+                    <a:lnT w="12240">
+                      <a:noFill/>
+                      <a:prstDash val="solid"/>
+                    </a:lnT>
+                    <a:lnB w="7200">
+                      <a:solidFill>
+                        <a:srgbClr val="000000"/>
+                      </a:solidFill>
+                      <a:prstDash val="solid"/>
+                    </a:lnB>
+                    <a:solidFill>
+                      <a:srgbClr val="81d41a"/>
                     </a:solidFill>
                   </a:tcPr>
                 </a:tc>
@@ -5420,8 +6027,236 @@
         <p:txBody>
           <a:bodyPr/>
           <a:p>
-            <a:fld id="{AFAD4918-280A-4FF4-A00C-E2C5C8B86813}" type="slidenum">
+            <a:fld id="{C1257D3B-62F3-4E36-B8FA-80D5CA7BCCE1}" type="slidenum">
               <a:t>8</a:t>
+            </a:fld>
+          </a:p>
+        </p:txBody>
+      </p:sp>
+    </p:spTree>
+  </p:cSld>
+  <mc:AlternateContent>
+    <mc:Choice Requires="p14">
+      <p:transition spd="slow" p14:dur="2000"/>
+    </mc:Choice>
+    <mc:Fallback>
+      <p:transition spd="slow"/>
+    </mc:Fallback>
+  </mc:AlternateContent>
+</p:sld>
+</file>
+
+<file path=ppt/slides/slide9.xml><?xml version="1.0" encoding="utf-8"?>
+<p:sld xmlns:a="http://schemas.openxmlformats.org/drawingml/2006/main" xmlns:p="http://schemas.openxmlformats.org/presentationml/2006/main" xmlns:r="http://schemas.openxmlformats.org/officeDocument/2006/relationships" xmlns:p14="http://schemas.microsoft.com/office/powerpoint/2010/main" xmlns:p15="http://schemas.microsoft.com/office/powerpoint/2012/main" xmlns:mc="http://schemas.openxmlformats.org/markup-compatibility/2006">
+  <p:cSld>
+    <p:spTree>
+      <p:nvGrpSpPr>
+        <p:cNvPr id="1" name=""/>
+        <p:cNvGrpSpPr/>
+        <p:nvPr/>
+      </p:nvGrpSpPr>
+      <p:grpSpPr>
+        <a:xfrm>
+          <a:off x="0" y="0"/>
+          <a:ext cx="0" cy="0"/>
+          <a:chOff x="0" y="0"/>
+          <a:chExt cx="0" cy="0"/>
+        </a:xfrm>
+      </p:grpSpPr>
+      <p:sp>
+        <p:nvSpPr>
+          <p:cNvPr id="34" name="PlaceHolder 1"/>
+          <p:cNvSpPr>
+            <a:spLocks noGrp="1"/>
+          </p:cNvSpPr>
+          <p:nvPr>
+            <p:ph type="title"/>
+          </p:nvPr>
+        </p:nvSpPr>
+        <p:spPr>
+          <a:xfrm>
+            <a:off x="360000" y="106200"/>
+            <a:ext cx="9359640" cy="625320"/>
+          </a:xfrm>
+          <a:prstGeom prst="rect">
+            <a:avLst/>
+          </a:prstGeom>
+          <a:noFill/>
+          <a:ln w="0">
+            <a:noFill/>
+          </a:ln>
+        </p:spPr>
+        <p:txBody>
+          <a:bodyPr lIns="0" rIns="0" tIns="0" bIns="0" anchor="ctr">
+            <a:spAutoFit/>
+          </a:bodyPr>
+          <a:p>
+            <a:pPr indent="0" algn="ctr">
+              <a:buNone/>
+            </a:pPr>
+            <a:r>
+              <a:rPr b="0" lang="en-AU" sz="4400" strike="noStrike" u="none">
+                <a:solidFill>
+                  <a:srgbClr val="000000"/>
+                </a:solidFill>
+                <a:effectLst/>
+                <a:uFillTx/>
+                <a:latin typeface="Arial"/>
+              </a:rPr>
+              <a:t>Performance Notes</a:t>
+            </a:r>
+            <a:endParaRPr b="0" lang="en-AU" sz="4400" strike="noStrike" u="none">
+              <a:solidFill>
+                <a:srgbClr val="000000"/>
+              </a:solidFill>
+              <a:effectLst/>
+              <a:uFillTx/>
+              <a:latin typeface="Arial"/>
+            </a:endParaRPr>
+          </a:p>
+        </p:txBody>
+      </p:sp>
+      <p:sp>
+        <p:nvSpPr>
+          <p:cNvPr id="35" name="PlaceHolder 2"/>
+          <p:cNvSpPr>
+            <a:spLocks noGrp="1"/>
+          </p:cNvSpPr>
+          <p:nvPr>
+            <p:ph/>
+          </p:nvPr>
+        </p:nvSpPr>
+        <p:spPr>
+          <a:xfrm>
+            <a:off x="360000" y="1080000"/>
+            <a:ext cx="9359640" cy="3599640"/>
+          </a:xfrm>
+          <a:prstGeom prst="rect">
+            <a:avLst/>
+          </a:prstGeom>
+          <a:noFill/>
+          <a:ln w="0">
+            <a:noFill/>
+          </a:ln>
+        </p:spPr>
+        <p:txBody>
+          <a:bodyPr lIns="0" rIns="0" tIns="0" bIns="0" anchor="t">
+            <a:normAutofit/>
+          </a:bodyPr>
+          <a:p>
+            <a:pPr marL="432000" indent="-324000">
+              <a:spcBef>
+                <a:spcPts val="1417"/>
+              </a:spcBef>
+              <a:buClr>
+                <a:srgbClr val="000000"/>
+              </a:buClr>
+              <a:buSzPct val="45000"/>
+              <a:buFont typeface="Wingdings" charset="2"/>
+              <a:buChar char=""/>
+            </a:pPr>
+            <a:r>
+              <a:rPr b="0" lang="en-AU" sz="3200" strike="noStrike" u="none">
+                <a:solidFill>
+                  <a:srgbClr val="000000"/>
+                </a:solidFill>
+                <a:effectLst/>
+                <a:uFillTx/>
+                <a:latin typeface="Arial"/>
+              </a:rPr>
+              <a:t>Performance of on-premise solution depends on the server configuration.</a:t>
+            </a:r>
+            <a:endParaRPr b="0" lang="en-AU" sz="3200" strike="noStrike" u="none">
+              <a:solidFill>
+                <a:srgbClr val="000000"/>
+              </a:solidFill>
+              <a:effectLst/>
+              <a:uFillTx/>
+              <a:latin typeface="Arial"/>
+            </a:endParaRPr>
+          </a:p>
+          <a:p>
+            <a:pPr marL="432000" indent="-324000">
+              <a:spcBef>
+                <a:spcPts val="1417"/>
+              </a:spcBef>
+              <a:buClr>
+                <a:srgbClr val="000000"/>
+              </a:buClr>
+              <a:buSzPct val="45000"/>
+              <a:buFont typeface="Wingdings" charset="2"/>
+              <a:buChar char=""/>
+            </a:pPr>
+            <a:r>
+              <a:rPr b="0" lang="en-AU" sz="3200" strike="noStrike" u="none">
+                <a:solidFill>
+                  <a:srgbClr val="000000"/>
+                </a:solidFill>
+                <a:effectLst/>
+                <a:uFillTx/>
+                <a:latin typeface="Arial"/>
+              </a:rPr>
+              <a:t>SaaS solutions allow to buy performance guarantees</a:t>
+            </a:r>
+            <a:endParaRPr b="0" lang="en-AU" sz="3200" strike="noStrike" u="none">
+              <a:solidFill>
+                <a:srgbClr val="000000"/>
+              </a:solidFill>
+              <a:effectLst/>
+              <a:uFillTx/>
+              <a:latin typeface="Arial"/>
+            </a:endParaRPr>
+          </a:p>
+          <a:p>
+            <a:pPr marL="432000" indent="-324000">
+              <a:spcBef>
+                <a:spcPts val="1417"/>
+              </a:spcBef>
+              <a:buClr>
+                <a:srgbClr val="000000"/>
+              </a:buClr>
+              <a:buSzPct val="45000"/>
+              <a:buFont typeface="Wingdings" charset="2"/>
+              <a:buChar char=""/>
+            </a:pPr>
+            <a:r>
+              <a:rPr b="0" lang="en-AU" sz="3200" strike="noStrike" u="none">
+                <a:solidFill>
+                  <a:srgbClr val="000000"/>
+                </a:solidFill>
+                <a:effectLst/>
+                <a:uFillTx/>
+                <a:latin typeface="Arial"/>
+              </a:rPr>
+              <a:t>REST API solutions are subject to rate limits of the vendor</a:t>
+            </a:r>
+            <a:endParaRPr b="0" lang="en-AU" sz="3200" strike="noStrike" u="none">
+              <a:solidFill>
+                <a:srgbClr val="000000"/>
+              </a:solidFill>
+              <a:effectLst/>
+              <a:uFillTx/>
+              <a:latin typeface="Arial"/>
+            </a:endParaRPr>
+          </a:p>
+        </p:txBody>
+      </p:sp>
+      <p:sp>
+        <p:nvSpPr>
+          <p:cNvPr id="4" name="PlaceHolder 3"/>
+          <p:cNvSpPr>
+            <a:spLocks noGrp="1"/>
+          </p:cNvSpPr>
+          <p:nvPr>
+            <p:ph type="sldNum" idx="3"/>
+          </p:nvPr>
+        </p:nvSpPr>
+        <p:spPr/>
+        <p:txBody>
+          <a:bodyPr/>
+          <a:p>
+            <a:fld id="{E6BAEEF8-DAFA-46F7-B39A-CCA74FF10F32}" type="slidenum">
+              <a:t>9</a:t>
             </a:fld>
           </a:p>
         </p:txBody>

</xml_diff>